<commit_message>
wrote results and discussion
</commit_message>
<xml_diff>
--- a/poster/Group9_poster.pptx
+++ b/poster/Group9_poster.pptx
@@ -49568,7 +49568,28 @@
           <a:p>
             <a:r>
               <a:rPr lang="en-US" dirty="0"/>
-              <a:t>The result of the described method are omni-directional stereo images, which can be viewed in the Google Cardboard. An example of such a omnidirectional stereo image, which consists of two stacked panoramas, can be seen in figure 2.</a:t>
+              <a:t>One intermediate result is the per pixel optical flow computation.</a:t>
+            </a:r>
+          </a:p>
+          <a:p>
+            <a:endParaRPr lang="en-US" dirty="0"/>
+          </a:p>
+          <a:p>
+            <a:endParaRPr lang="en-US" dirty="0"/>
+          </a:p>
+          <a:p>
+            <a:endParaRPr lang="en-US" dirty="0"/>
+          </a:p>
+          <a:p>
+            <a:endParaRPr lang="en-US" dirty="0"/>
+          </a:p>
+          <a:p>
+            <a:endParaRPr lang="en-US" dirty="0"/>
+          </a:p>
+          <a:p>
+            <a:r>
+              <a:rPr lang="en-US" dirty="0"/>
+              <a:t>The final results of the described method are omni-directional stereo images (see figure 3), which can be viewed in the Google Cardboard.</a:t>
             </a:r>
           </a:p>
           <a:p>
@@ -49605,10 +49626,10 @@
             <a:endParaRPr lang="de-CH" dirty="0"/>
           </a:p>
           <a:p>
-            <a:endParaRPr lang="de-CH" dirty="0"/>
+            <a:endParaRPr lang="en-US" b="1" dirty="0"/>
           </a:p>
           <a:p>
-            <a:endParaRPr lang="de-CH" dirty="0"/>
+            <a:endParaRPr lang="en-US" b="1" dirty="0"/>
           </a:p>
           <a:p>
             <a:r>
@@ -49707,7 +49728,7 @@
             </a:r>
             <a:r>
               <a:rPr lang="de-CH" dirty="0" err="1"/>
-              <a:t>reason</a:t>
+              <a:t>main</a:t>
             </a:r>
             <a:r>
               <a:rPr lang="de-CH" dirty="0"/>
@@ -49715,7 +49736,7 @@
             </a:r>
             <a:r>
               <a:rPr lang="de-CH" dirty="0" err="1"/>
-              <a:t>for</a:t>
+              <a:t>reason</a:t>
             </a:r>
             <a:r>
               <a:rPr lang="de-CH" dirty="0"/>
@@ -49723,7 +49744,7 @@
             </a:r>
             <a:r>
               <a:rPr lang="de-CH" dirty="0" err="1"/>
-              <a:t>this</a:t>
+              <a:t>for</a:t>
             </a:r>
             <a:r>
               <a:rPr lang="de-CH" dirty="0"/>
@@ -49731,7 +49752,7 @@
             </a:r>
             <a:r>
               <a:rPr lang="de-CH" dirty="0" err="1"/>
-              <a:t>is</a:t>
+              <a:t>the</a:t>
             </a:r>
             <a:r>
               <a:rPr lang="de-CH" dirty="0"/>
@@ -49739,7 +49760,7 @@
             </a:r>
             <a:r>
               <a:rPr lang="de-CH" dirty="0" err="1"/>
-              <a:t>that</a:t>
+              <a:t>lower</a:t>
             </a:r>
             <a:r>
               <a:rPr lang="de-CH" dirty="0"/>
@@ -49747,7 +49768,7 @@
             </a:r>
             <a:r>
               <a:rPr lang="de-CH" dirty="0" err="1"/>
-              <a:t>we</a:t>
+              <a:t>visual</a:t>
             </a:r>
             <a:r>
               <a:rPr lang="de-CH" dirty="0"/>
@@ -49755,6 +49776,62 @@
             </a:r>
             <a:r>
               <a:rPr lang="de-CH" dirty="0" err="1"/>
+              <a:t>quality</a:t>
+            </a:r>
+            <a:r>
+              <a:rPr lang="de-CH" dirty="0"/>
+              <a:t> </a:t>
+            </a:r>
+            <a:r>
+              <a:rPr lang="de-CH" dirty="0" err="1"/>
+              <a:t>of</a:t>
+            </a:r>
+            <a:r>
+              <a:rPr lang="de-CH" dirty="0"/>
+              <a:t> </a:t>
+            </a:r>
+            <a:r>
+              <a:rPr lang="de-CH" dirty="0" err="1"/>
+              <a:t>our</a:t>
+            </a:r>
+            <a:r>
+              <a:rPr lang="de-CH" dirty="0"/>
+              <a:t> </a:t>
+            </a:r>
+            <a:r>
+              <a:rPr lang="de-CH" dirty="0" err="1"/>
+              <a:t>panoramas</a:t>
+            </a:r>
+            <a:r>
+              <a:rPr lang="de-CH" dirty="0"/>
+              <a:t> </a:t>
+            </a:r>
+            <a:r>
+              <a:rPr lang="de-CH" dirty="0" err="1"/>
+              <a:t>is</a:t>
+            </a:r>
+            <a:r>
+              <a:rPr lang="de-CH" dirty="0"/>
+              <a:t> </a:t>
+            </a:r>
+            <a:r>
+              <a:rPr lang="de-CH" dirty="0" err="1"/>
+              <a:t>that</a:t>
+            </a:r>
+            <a:r>
+              <a:rPr lang="de-CH" dirty="0"/>
+              <a:t> </a:t>
+            </a:r>
+            <a:r>
+              <a:rPr lang="de-CH" dirty="0" err="1"/>
+              <a:t>we</a:t>
+            </a:r>
+            <a:r>
+              <a:rPr lang="de-CH" dirty="0"/>
+              <a:t> </a:t>
+            </a:r>
+            <a:r>
+              <a:rPr lang="de-CH" dirty="0" err="1"/>
               <a:t>used</a:t>
             </a:r>
             <a:r>
@@ -49851,7 +49928,199 @@
             </a:r>
             <a:r>
               <a:rPr lang="de-CH" dirty="0" err="1"/>
-              <a:t>Furthermore</a:t>
+              <a:t>Because</a:t>
+            </a:r>
+            <a:r>
+              <a:rPr lang="de-CH" dirty="0"/>
+              <a:t> </a:t>
+            </a:r>
+            <a:r>
+              <a:rPr lang="de-CH" dirty="0" err="1"/>
+              <a:t>our</a:t>
+            </a:r>
+            <a:r>
+              <a:rPr lang="de-CH" dirty="0"/>
+              <a:t> </a:t>
+            </a:r>
+            <a:r>
+              <a:rPr lang="de-CH" dirty="0" err="1"/>
+              <a:t>method</a:t>
+            </a:r>
+            <a:r>
+              <a:rPr lang="de-CH" dirty="0"/>
+              <a:t> </a:t>
+            </a:r>
+            <a:r>
+              <a:rPr lang="de-CH" dirty="0" err="1"/>
+              <a:t>is</a:t>
+            </a:r>
+            <a:r>
+              <a:rPr lang="de-CH" dirty="0"/>
+              <a:t> not </a:t>
+            </a:r>
+            <a:r>
+              <a:rPr lang="de-CH" dirty="0" err="1"/>
+              <a:t>based</a:t>
+            </a:r>
+            <a:r>
+              <a:rPr lang="de-CH" dirty="0"/>
+              <a:t> on a </a:t>
+            </a:r>
+            <a:r>
+              <a:rPr lang="de-CH" dirty="0" err="1"/>
+              <a:t>coarse</a:t>
+            </a:r>
+            <a:r>
+              <a:rPr lang="de-CH" dirty="0"/>
+              <a:t>-</a:t>
+            </a:r>
+            <a:r>
+              <a:rPr lang="de-CH" dirty="0" err="1"/>
+              <a:t>to</a:t>
+            </a:r>
+            <a:r>
+              <a:rPr lang="de-CH" dirty="0"/>
+              <a:t>-fine </a:t>
+            </a:r>
+            <a:r>
+              <a:rPr lang="de-CH" dirty="0" err="1"/>
+              <a:t>approach</a:t>
+            </a:r>
+            <a:r>
+              <a:rPr lang="de-CH" dirty="0"/>
+              <a:t> like </a:t>
+            </a:r>
+            <a:r>
+              <a:rPr lang="de-CH" dirty="0" err="1"/>
+              <a:t>the</a:t>
+            </a:r>
+            <a:r>
+              <a:rPr lang="de-CH" dirty="0"/>
+              <a:t> </a:t>
+            </a:r>
+            <a:r>
+              <a:rPr lang="de-CH" dirty="0" err="1"/>
+              <a:t>procedure</a:t>
+            </a:r>
+            <a:r>
+              <a:rPr lang="de-CH" dirty="0"/>
+              <a:t> </a:t>
+            </a:r>
+            <a:r>
+              <a:rPr lang="de-CH" dirty="0" err="1"/>
+              <a:t>presented</a:t>
+            </a:r>
+            <a:r>
+              <a:rPr lang="de-CH" dirty="0"/>
+              <a:t> in </a:t>
+            </a:r>
+            <a:r>
+              <a:rPr lang="de-CH" dirty="0" err="1"/>
+              <a:t>the</a:t>
+            </a:r>
+            <a:r>
+              <a:rPr lang="de-CH" dirty="0"/>
+              <a:t> Jump </a:t>
+            </a:r>
+            <a:r>
+              <a:rPr lang="de-CH" dirty="0" err="1"/>
+              <a:t>paper</a:t>
+            </a:r>
+            <a:r>
+              <a:rPr lang="de-CH" dirty="0"/>
+              <a:t>. </a:t>
+            </a:r>
+            <a:r>
+              <a:rPr lang="de-CH" dirty="0" err="1"/>
+              <a:t>We</a:t>
+            </a:r>
+            <a:r>
+              <a:rPr lang="de-CH" dirty="0"/>
+              <a:t> </a:t>
+            </a:r>
+            <a:r>
+              <a:rPr lang="de-CH" dirty="0" err="1"/>
+              <a:t>adapted</a:t>
+            </a:r>
+            <a:r>
+              <a:rPr lang="de-CH" dirty="0"/>
+              <a:t> </a:t>
+            </a:r>
+            <a:r>
+              <a:rPr lang="de-CH" dirty="0" err="1"/>
+              <a:t>the</a:t>
+            </a:r>
+            <a:r>
+              <a:rPr lang="de-CH" dirty="0"/>
+              <a:t> </a:t>
+            </a:r>
+            <a:r>
+              <a:rPr lang="de-CH" dirty="0" err="1"/>
+              <a:t>standard</a:t>
+            </a:r>
+            <a:r>
+              <a:rPr lang="de-CH" dirty="0"/>
+              <a:t> per-pixel </a:t>
+            </a:r>
+            <a:r>
+              <a:rPr lang="de-CH" dirty="0" err="1"/>
+              <a:t>optical</a:t>
+            </a:r>
+            <a:r>
+              <a:rPr lang="de-CH" dirty="0"/>
+              <a:t> </a:t>
+            </a:r>
+            <a:r>
+              <a:rPr lang="de-CH" dirty="0" err="1"/>
+              <a:t>flow</a:t>
+            </a:r>
+            <a:r>
+              <a:rPr lang="de-CH" dirty="0"/>
+              <a:t> </a:t>
+            </a:r>
+            <a:r>
+              <a:rPr lang="de-CH" dirty="0" err="1"/>
+              <a:t>method</a:t>
+            </a:r>
+            <a:r>
+              <a:rPr lang="de-CH" dirty="0"/>
+              <a:t> </a:t>
+            </a:r>
+            <a:r>
+              <a:rPr lang="de-CH" dirty="0" err="1"/>
+              <a:t>of</a:t>
+            </a:r>
+            <a:r>
+              <a:rPr lang="de-CH" dirty="0"/>
+              <a:t> </a:t>
+            </a:r>
+            <a:r>
+              <a:rPr lang="de-CH" dirty="0" err="1"/>
+              <a:t>the</a:t>
+            </a:r>
+            <a:r>
+              <a:rPr lang="de-CH" dirty="0"/>
+              <a:t> </a:t>
+            </a:r>
+            <a:r>
+              <a:rPr lang="de-CH" dirty="0" err="1"/>
+              <a:t>OpenCV</a:t>
+            </a:r>
+            <a:r>
+              <a:rPr lang="de-CH" dirty="0"/>
+              <a:t> </a:t>
+            </a:r>
+            <a:r>
+              <a:rPr lang="de-CH" dirty="0" err="1"/>
+              <a:t>libary</a:t>
+            </a:r>
+            <a:r>
+              <a:rPr lang="de-CH" dirty="0"/>
+              <a:t>. </a:t>
+            </a:r>
+            <a:r>
+              <a:rPr lang="de-CH" dirty="0" err="1"/>
+              <a:t>Additionally</a:t>
             </a:r>
             <a:r>
               <a:rPr lang="de-CH" dirty="0"/>
@@ -49859,7 +50128,7 @@
             </a:r>
             <a:r>
               <a:rPr lang="de-CH" dirty="0" err="1"/>
-              <a:t>we</a:t>
+              <a:t>this</a:t>
             </a:r>
             <a:r>
               <a:rPr lang="de-CH" dirty="0"/>
@@ -49867,6 +50136,238 @@
             </a:r>
             <a:r>
               <a:rPr lang="de-CH" dirty="0" err="1"/>
+              <a:t>approach</a:t>
+            </a:r>
+            <a:r>
+              <a:rPr lang="de-CH" dirty="0"/>
+              <a:t> </a:t>
+            </a:r>
+            <a:r>
+              <a:rPr lang="de-CH" dirty="0" err="1"/>
+              <a:t>does</a:t>
+            </a:r>
+            <a:r>
+              <a:rPr lang="de-CH" dirty="0"/>
+              <a:t> not </a:t>
+            </a:r>
+            <a:r>
+              <a:rPr lang="de-CH" dirty="0" err="1"/>
+              <a:t>take</a:t>
+            </a:r>
+            <a:r>
+              <a:rPr lang="de-CH" dirty="0"/>
+              <a:t> </a:t>
+            </a:r>
+            <a:r>
+              <a:rPr lang="de-CH" dirty="0" err="1"/>
+              <a:t>into</a:t>
+            </a:r>
+            <a:r>
+              <a:rPr lang="de-CH" dirty="0"/>
+              <a:t> </a:t>
+            </a:r>
+            <a:r>
+              <a:rPr lang="de-CH" dirty="0" err="1"/>
+              <a:t>account</a:t>
+            </a:r>
+            <a:r>
+              <a:rPr lang="de-CH" dirty="0"/>
+              <a:t> </a:t>
+            </a:r>
+            <a:r>
+              <a:rPr lang="de-CH" dirty="0" err="1"/>
+              <a:t>the</a:t>
+            </a:r>
+            <a:r>
+              <a:rPr lang="de-CH" dirty="0"/>
+              <a:t> </a:t>
+            </a:r>
+            <a:r>
+              <a:rPr lang="de-CH" dirty="0" err="1"/>
+              <a:t>borders</a:t>
+            </a:r>
+            <a:r>
+              <a:rPr lang="de-CH" dirty="0"/>
+              <a:t> </a:t>
+            </a:r>
+            <a:r>
+              <a:rPr lang="de-CH" dirty="0" err="1"/>
+              <a:t>of</a:t>
+            </a:r>
+            <a:r>
+              <a:rPr lang="de-CH" dirty="0"/>
+              <a:t> an </a:t>
+            </a:r>
+            <a:r>
+              <a:rPr lang="de-CH" dirty="0" err="1"/>
+              <a:t>object</a:t>
+            </a:r>
+            <a:r>
+              <a:rPr lang="de-CH" dirty="0"/>
+              <a:t> </a:t>
+            </a:r>
+            <a:r>
+              <a:rPr lang="de-CH" dirty="0" err="1"/>
+              <a:t>and</a:t>
+            </a:r>
+            <a:r>
+              <a:rPr lang="de-CH" dirty="0"/>
+              <a:t> </a:t>
+            </a:r>
+            <a:r>
+              <a:rPr lang="de-CH" dirty="0" err="1"/>
+              <a:t>is</a:t>
+            </a:r>
+            <a:r>
+              <a:rPr lang="de-CH" dirty="0"/>
+              <a:t> </a:t>
+            </a:r>
+            <a:r>
+              <a:rPr lang="de-CH" dirty="0" err="1"/>
+              <a:t>therefore</a:t>
+            </a:r>
+            <a:r>
+              <a:rPr lang="de-CH" dirty="0"/>
+              <a:t> not </a:t>
+            </a:r>
+            <a:r>
+              <a:rPr lang="de-CH" dirty="0" err="1"/>
+              <a:t>edge</a:t>
+            </a:r>
+            <a:r>
+              <a:rPr lang="de-CH" dirty="0"/>
+              <a:t> </a:t>
+            </a:r>
+            <a:r>
+              <a:rPr lang="de-CH" dirty="0" err="1"/>
+              <a:t>preserving</a:t>
+            </a:r>
+            <a:r>
+              <a:rPr lang="de-CH" dirty="0"/>
+              <a:t> in </a:t>
+            </a:r>
+            <a:r>
+              <a:rPr lang="de-CH" dirty="0" err="1"/>
+              <a:t>contrast</a:t>
+            </a:r>
+            <a:r>
+              <a:rPr lang="de-CH" dirty="0"/>
+              <a:t> </a:t>
+            </a:r>
+            <a:r>
+              <a:rPr lang="de-CH" dirty="0" err="1"/>
+              <a:t>to</a:t>
+            </a:r>
+            <a:r>
+              <a:rPr lang="de-CH" dirty="0"/>
+              <a:t> </a:t>
+            </a:r>
+            <a:r>
+              <a:rPr lang="de-CH" dirty="0" err="1"/>
+              <a:t>the</a:t>
+            </a:r>
+            <a:r>
+              <a:rPr lang="de-CH" dirty="0"/>
+              <a:t> bilateral-</a:t>
+            </a:r>
+            <a:r>
+              <a:rPr lang="de-CH" dirty="0" err="1"/>
+              <a:t>solver</a:t>
+            </a:r>
+            <a:r>
+              <a:rPr lang="de-CH" dirty="0"/>
+              <a:t> </a:t>
+            </a:r>
+            <a:r>
+              <a:rPr lang="de-CH" dirty="0" err="1"/>
+              <a:t>used</a:t>
+            </a:r>
+            <a:r>
+              <a:rPr lang="de-CH" dirty="0"/>
+              <a:t> in </a:t>
+            </a:r>
+            <a:r>
+              <a:rPr lang="de-CH" dirty="0" err="1"/>
+              <a:t>the</a:t>
+            </a:r>
+            <a:r>
+              <a:rPr lang="de-CH" dirty="0"/>
+              <a:t> Jump </a:t>
+            </a:r>
+            <a:r>
+              <a:rPr lang="de-CH" dirty="0" err="1"/>
+              <a:t>paper</a:t>
+            </a:r>
+            <a:r>
+              <a:rPr lang="de-CH" dirty="0"/>
+              <a:t>, </a:t>
+            </a:r>
+            <a:r>
+              <a:rPr lang="de-CH" dirty="0" err="1"/>
+              <a:t>which</a:t>
+            </a:r>
+            <a:r>
+              <a:rPr lang="de-CH" dirty="0"/>
+              <a:t> also </a:t>
+            </a:r>
+            <a:r>
+              <a:rPr lang="de-CH" dirty="0" err="1"/>
+              <a:t>respects</a:t>
+            </a:r>
+            <a:r>
+              <a:rPr lang="de-CH" dirty="0"/>
+              <a:t> </a:t>
+            </a:r>
+            <a:r>
+              <a:rPr lang="de-CH" dirty="0" err="1"/>
+              <a:t>the</a:t>
+            </a:r>
+            <a:r>
+              <a:rPr lang="de-CH" dirty="0"/>
+              <a:t> </a:t>
+            </a:r>
+            <a:r>
+              <a:rPr lang="de-CH" dirty="0" err="1"/>
+              <a:t>edges</a:t>
+            </a:r>
+            <a:r>
+              <a:rPr lang="de-CH" dirty="0"/>
+              <a:t> in </a:t>
+            </a:r>
+            <a:r>
+              <a:rPr lang="de-CH" dirty="0" err="1"/>
+              <a:t>the</a:t>
+            </a:r>
+            <a:r>
+              <a:rPr lang="de-CH" dirty="0"/>
+              <a:t> </a:t>
+            </a:r>
+            <a:r>
+              <a:rPr lang="de-CH" dirty="0" err="1"/>
+              <a:t>image</a:t>
+            </a:r>
+            <a:r>
+              <a:rPr lang="de-CH" dirty="0"/>
+              <a:t>. </a:t>
+            </a:r>
+            <a:r>
+              <a:rPr lang="de-CH" dirty="0" err="1"/>
+              <a:t>Furthermore</a:t>
+            </a:r>
+            <a:r>
+              <a:rPr lang="de-CH" dirty="0"/>
+              <a:t>, </a:t>
+            </a:r>
+            <a:r>
+              <a:rPr lang="de-CH" dirty="0" err="1"/>
+              <a:t>we</a:t>
+            </a:r>
+            <a:r>
+              <a:rPr lang="de-CH" dirty="0"/>
+              <a:t> </a:t>
+            </a:r>
+            <a:r>
+              <a:rPr lang="de-CH" dirty="0" err="1"/>
               <a:t>used</a:t>
             </a:r>
             <a:r>
@@ -49899,7 +50400,15 @@
             </a:r>
             <a:r>
               <a:rPr lang="de-CH" dirty="0" err="1"/>
-              <a:t>and</a:t>
+              <a:t>based</a:t>
+            </a:r>
+            <a:r>
+              <a:rPr lang="de-CH" dirty="0"/>
+              <a:t> on a simple linear </a:t>
+            </a:r>
+            <a:r>
+              <a:rPr lang="de-CH" dirty="0" err="1"/>
+              <a:t>interpolation</a:t>
             </a:r>
             <a:r>
               <a:rPr lang="de-CH" dirty="0"/>
@@ -49907,7 +50416,7 @@
             </a:r>
             <a:r>
               <a:rPr lang="de-CH" dirty="0" err="1"/>
-              <a:t>we</a:t>
+              <a:t>and</a:t>
             </a:r>
             <a:r>
               <a:rPr lang="de-CH" dirty="0"/>
@@ -49915,7 +50424,7 @@
             </a:r>
             <a:r>
               <a:rPr lang="de-CH" dirty="0" err="1"/>
-              <a:t>simplified</a:t>
+              <a:t>we</a:t>
             </a:r>
             <a:r>
               <a:rPr lang="de-CH" dirty="0"/>
@@ -49923,7 +50432,7 @@
             </a:r>
             <a:r>
               <a:rPr lang="de-CH" dirty="0" err="1"/>
-              <a:t>the</a:t>
+              <a:t>simplified</a:t>
             </a:r>
             <a:r>
               <a:rPr lang="de-CH" dirty="0"/>
@@ -49931,7 +50440,7 @@
             </a:r>
             <a:r>
               <a:rPr lang="de-CH" dirty="0" err="1"/>
-              <a:t>stitching</a:t>
+              <a:t>the</a:t>
             </a:r>
             <a:r>
               <a:rPr lang="de-CH" dirty="0"/>
@@ -49939,15 +50448,22 @@
             </a:r>
             <a:r>
               <a:rPr lang="de-CH" dirty="0" err="1"/>
+              <a:t>stitching</a:t>
+            </a:r>
+            <a:r>
+              <a:rPr lang="de-CH" dirty="0"/>
+              <a:t> </a:t>
+            </a:r>
+            <a:r>
+              <a:rPr lang="de-CH" dirty="0" err="1"/>
               <a:t>prodcedure</a:t>
             </a:r>
             <a:r>
               <a:rPr lang="de-CH" dirty="0"/>
               <a:t>.</a:t>
             </a:r>
-            <a:br>
-              <a:rPr lang="de-CH" dirty="0"/>
-            </a:br>
+          </a:p>
+          <a:p>
             <a:r>
               <a:rPr lang="de-CH" dirty="0" err="1"/>
               <a:t>Moreover</a:t>
@@ -50698,7 +51214,7 @@
         </p:nvSpPr>
         <p:spPr>
           <a:xfrm>
-            <a:off x="1303297" y="9019108"/>
+            <a:off x="1303297" y="9060774"/>
             <a:ext cx="2727227" cy="246366"/>
           </a:xfrm>
           <a:prstGeom prst="rect">
@@ -50760,2570 +51276,6 @@
           </a:p>
         </p:txBody>
       </p:sp>
-      <p:graphicFrame>
-        <p:nvGraphicFramePr>
-          <p:cNvPr id="49" name="Bildplatzhalter 5"/>
-          <p:cNvGraphicFramePr>
-            <a:graphicFrameLocks/>
-          </p:cNvGraphicFramePr>
-          <p:nvPr>
-            <p:extLst>
-              <p:ext uri="{D42A27DB-BD31-4B8C-83A1-F6EECF244321}">
-                <p14:modId xmlns:p14="http://schemas.microsoft.com/office/powerpoint/2010/main" val="3546765381"/>
-              </p:ext>
-            </p:extLst>
-          </p:nvPr>
-        </p:nvGraphicFramePr>
-        <p:xfrm>
-          <a:off x="5720392" y="9451156"/>
-          <a:ext cx="3852429" cy="839040"/>
-        </p:xfrm>
-        <a:graphic>
-          <a:graphicData uri="http://schemas.openxmlformats.org/drawingml/2006/table">
-            <a:tbl>
-              <a:tblPr firstRow="1" bandRow="1">
-                <a:tableStyleId>{5C22544A-7EE6-4342-B048-85BDC9FD1C3A}</a:tableStyleId>
-              </a:tblPr>
-              <a:tblGrid>
-                <a:gridCol w="1125045">
-                  <a:extLst>
-                    <a:ext uri="{9D8B030D-6E8A-4147-A177-3AD203B41FA5}">
-                      <a16:colId xmlns:a16="http://schemas.microsoft.com/office/drawing/2014/main" val="20000"/>
-                    </a:ext>
-                  </a:extLst>
-                </a:gridCol>
-                <a:gridCol w="340923">
-                  <a:extLst>
-                    <a:ext uri="{9D8B030D-6E8A-4147-A177-3AD203B41FA5}">
-                      <a16:colId xmlns:a16="http://schemas.microsoft.com/office/drawing/2014/main" val="20001"/>
-                    </a:ext>
-                  </a:extLst>
-                </a:gridCol>
-                <a:gridCol w="340923">
-                  <a:extLst>
-                    <a:ext uri="{9D8B030D-6E8A-4147-A177-3AD203B41FA5}">
-                      <a16:colId xmlns:a16="http://schemas.microsoft.com/office/drawing/2014/main" val="20002"/>
-                    </a:ext>
-                  </a:extLst>
-                </a:gridCol>
-                <a:gridCol w="340923">
-                  <a:extLst>
-                    <a:ext uri="{9D8B030D-6E8A-4147-A177-3AD203B41FA5}">
-                      <a16:colId xmlns:a16="http://schemas.microsoft.com/office/drawing/2014/main" val="20003"/>
-                    </a:ext>
-                  </a:extLst>
-                </a:gridCol>
-                <a:gridCol w="340923">
-                  <a:extLst>
-                    <a:ext uri="{9D8B030D-6E8A-4147-A177-3AD203B41FA5}">
-                      <a16:colId xmlns:a16="http://schemas.microsoft.com/office/drawing/2014/main" val="20004"/>
-                    </a:ext>
-                  </a:extLst>
-                </a:gridCol>
-                <a:gridCol w="340923">
-                  <a:extLst>
-                    <a:ext uri="{9D8B030D-6E8A-4147-A177-3AD203B41FA5}">
-                      <a16:colId xmlns:a16="http://schemas.microsoft.com/office/drawing/2014/main" val="20005"/>
-                    </a:ext>
-                  </a:extLst>
-                </a:gridCol>
-                <a:gridCol w="340923">
-                  <a:extLst>
-                    <a:ext uri="{9D8B030D-6E8A-4147-A177-3AD203B41FA5}">
-                      <a16:colId xmlns:a16="http://schemas.microsoft.com/office/drawing/2014/main" val="20006"/>
-                    </a:ext>
-                  </a:extLst>
-                </a:gridCol>
-                <a:gridCol w="340923">
-                  <a:extLst>
-                    <a:ext uri="{9D8B030D-6E8A-4147-A177-3AD203B41FA5}">
-                      <a16:colId xmlns:a16="http://schemas.microsoft.com/office/drawing/2014/main" val="20007"/>
-                    </a:ext>
-                  </a:extLst>
-                </a:gridCol>
-                <a:gridCol w="340923">
-                  <a:extLst>
-                    <a:ext uri="{9D8B030D-6E8A-4147-A177-3AD203B41FA5}">
-                      <a16:colId xmlns:a16="http://schemas.microsoft.com/office/drawing/2014/main" val="20008"/>
-                    </a:ext>
-                  </a:extLst>
-                </a:gridCol>
-              </a:tblGrid>
-              <a:tr h="141027">
-                <a:tc>
-                  <a:txBody>
-                    <a:bodyPr/>
-                    <a:lstStyle/>
-                    <a:p>
-                      <a:r>
-                        <a:rPr lang="de-CH" sz="600" dirty="0">
-                          <a:solidFill>
-                            <a:schemeClr val="accent1"/>
-                          </a:solidFill>
-                        </a:rPr>
-                        <a:t>Table title </a:t>
-                      </a:r>
-                      <a:r>
-                        <a:rPr lang="de-CH" sz="600" dirty="0" err="1">
-                          <a:solidFill>
-                            <a:schemeClr val="accent1"/>
-                          </a:solidFill>
-                        </a:rPr>
-                        <a:t>left</a:t>
-                      </a:r>
-                      <a:endParaRPr lang="de-CH" sz="600" dirty="0">
-                        <a:solidFill>
-                          <a:schemeClr val="accent1"/>
-                        </a:solidFill>
-                      </a:endParaRPr>
-                    </a:p>
-                  </a:txBody>
-                  <a:tcPr marL="50911" marR="50911" marT="25456" marB="50912">
-                    <a:lnL w="12700" cmpd="sng">
-                      <a:noFill/>
-                    </a:lnL>
-                    <a:lnR w="12700" cmpd="sng">
-                      <a:noFill/>
-                    </a:lnR>
-                    <a:lnT w="12700" cmpd="sng">
-                      <a:noFill/>
-                    </a:lnT>
-                    <a:lnB w="6350" cap="flat" cmpd="sng" algn="ctr">
-                      <a:solidFill>
-                        <a:schemeClr val="tx1"/>
-                      </a:solidFill>
-                      <a:prstDash val="solid"/>
-                      <a:round/>
-                      <a:headEnd type="none" w="med" len="med"/>
-                      <a:tailEnd type="none" w="med" len="med"/>
-                    </a:lnB>
-                    <a:lnTlToBr w="12700" cmpd="sng">
-                      <a:noFill/>
-                      <a:prstDash val="solid"/>
-                    </a:lnTlToBr>
-                    <a:lnBlToTr w="12700" cmpd="sng">
-                      <a:noFill/>
-                      <a:prstDash val="solid"/>
-                    </a:lnBlToTr>
-                    <a:solidFill>
-                      <a:schemeClr val="accent6"/>
-                    </a:solidFill>
-                  </a:tcPr>
-                </a:tc>
-                <a:tc>
-                  <a:txBody>
-                    <a:bodyPr/>
-                    <a:lstStyle/>
-                    <a:p>
-                      <a:pPr algn="r"/>
-                      <a:r>
-                        <a:rPr lang="de-CH" sz="600" dirty="0">
-                          <a:solidFill>
-                            <a:schemeClr val="accent1"/>
-                          </a:solidFill>
-                        </a:rPr>
-                        <a:t>511</a:t>
-                      </a:r>
-                    </a:p>
-                  </a:txBody>
-                  <a:tcPr marL="50911" marR="50911" marT="25456" marB="50912">
-                    <a:lnL w="12700" cmpd="sng">
-                      <a:noFill/>
-                    </a:lnL>
-                    <a:lnR w="12700" cmpd="sng">
-                      <a:noFill/>
-                    </a:lnR>
-                    <a:lnT w="12700" cmpd="sng">
-                      <a:noFill/>
-                    </a:lnT>
-                    <a:lnB w="6350" cap="flat" cmpd="sng" algn="ctr">
-                      <a:solidFill>
-                        <a:schemeClr val="tx1"/>
-                      </a:solidFill>
-                      <a:prstDash val="solid"/>
-                      <a:round/>
-                      <a:headEnd type="none" w="med" len="med"/>
-                      <a:tailEnd type="none" w="med" len="med"/>
-                    </a:lnB>
-                    <a:lnTlToBr w="12700" cmpd="sng">
-                      <a:noFill/>
-                      <a:prstDash val="solid"/>
-                    </a:lnTlToBr>
-                    <a:lnBlToTr w="12700" cmpd="sng">
-                      <a:noFill/>
-                      <a:prstDash val="solid"/>
-                    </a:lnBlToTr>
-                    <a:solidFill>
-                      <a:schemeClr val="accent5"/>
-                    </a:solidFill>
-                  </a:tcPr>
-                </a:tc>
-                <a:tc>
-                  <a:txBody>
-                    <a:bodyPr/>
-                    <a:lstStyle/>
-                    <a:p>
-                      <a:pPr algn="r"/>
-                      <a:r>
-                        <a:rPr lang="de-CH" sz="600" dirty="0">
-                          <a:solidFill>
-                            <a:schemeClr val="accent1"/>
-                          </a:solidFill>
-                        </a:rPr>
-                        <a:t>334</a:t>
-                      </a:r>
-                    </a:p>
-                  </a:txBody>
-                  <a:tcPr marL="50911" marR="50911" marT="25456" marB="50912">
-                    <a:lnL w="12700" cmpd="sng">
-                      <a:noFill/>
-                    </a:lnL>
-                    <a:lnR w="12700" cmpd="sng">
-                      <a:noFill/>
-                    </a:lnR>
-                    <a:lnT w="12700" cmpd="sng">
-                      <a:noFill/>
-                    </a:lnT>
-                    <a:lnB w="6350" cap="flat" cmpd="sng" algn="ctr">
-                      <a:solidFill>
-                        <a:schemeClr val="tx1"/>
-                      </a:solidFill>
-                      <a:prstDash val="solid"/>
-                      <a:round/>
-                      <a:headEnd type="none" w="med" len="med"/>
-                      <a:tailEnd type="none" w="med" len="med"/>
-                    </a:lnB>
-                    <a:lnTlToBr w="12700" cmpd="sng">
-                      <a:noFill/>
-                      <a:prstDash val="solid"/>
-                    </a:lnTlToBr>
-                    <a:lnBlToTr w="12700" cmpd="sng">
-                      <a:noFill/>
-                      <a:prstDash val="solid"/>
-                    </a:lnBlToTr>
-                    <a:solidFill>
-                      <a:schemeClr val="accent6"/>
-                    </a:solidFill>
-                  </a:tcPr>
-                </a:tc>
-                <a:tc>
-                  <a:txBody>
-                    <a:bodyPr/>
-                    <a:lstStyle/>
-                    <a:p>
-                      <a:pPr algn="r"/>
-                      <a:r>
-                        <a:rPr lang="de-CH" sz="600" dirty="0">
-                          <a:solidFill>
-                            <a:schemeClr val="accent1"/>
-                          </a:solidFill>
-                        </a:rPr>
-                        <a:t>372</a:t>
-                      </a:r>
-                    </a:p>
-                  </a:txBody>
-                  <a:tcPr marL="50911" marR="50911" marT="25456" marB="50912">
-                    <a:lnL w="12700" cmpd="sng">
-                      <a:noFill/>
-                    </a:lnL>
-                    <a:lnR w="12700" cmpd="sng">
-                      <a:noFill/>
-                    </a:lnR>
-                    <a:lnT w="12700" cmpd="sng">
-                      <a:noFill/>
-                    </a:lnT>
-                    <a:lnB w="6350" cap="flat" cmpd="sng" algn="ctr">
-                      <a:solidFill>
-                        <a:schemeClr val="tx1"/>
-                      </a:solidFill>
-                      <a:prstDash val="solid"/>
-                      <a:round/>
-                      <a:headEnd type="none" w="med" len="med"/>
-                      <a:tailEnd type="none" w="med" len="med"/>
-                    </a:lnB>
-                    <a:lnTlToBr w="12700" cmpd="sng">
-                      <a:noFill/>
-                      <a:prstDash val="solid"/>
-                    </a:lnTlToBr>
-                    <a:lnBlToTr w="12700" cmpd="sng">
-                      <a:noFill/>
-                      <a:prstDash val="solid"/>
-                    </a:lnBlToTr>
-                    <a:solidFill>
-                      <a:schemeClr val="accent5"/>
-                    </a:solidFill>
-                  </a:tcPr>
-                </a:tc>
-                <a:tc>
-                  <a:txBody>
-                    <a:bodyPr/>
-                    <a:lstStyle/>
-                    <a:p>
-                      <a:pPr algn="r"/>
-                      <a:r>
-                        <a:rPr lang="de-CH" sz="600" dirty="0">
-                          <a:solidFill>
-                            <a:schemeClr val="accent1"/>
-                          </a:solidFill>
-                        </a:rPr>
-                        <a:t>76</a:t>
-                      </a:r>
-                    </a:p>
-                  </a:txBody>
-                  <a:tcPr marL="50911" marR="50911" marT="25456" marB="50912">
-                    <a:lnL w="12700" cmpd="sng">
-                      <a:noFill/>
-                    </a:lnL>
-                    <a:lnR w="12700" cmpd="sng">
-                      <a:noFill/>
-                    </a:lnR>
-                    <a:lnT w="12700" cmpd="sng">
-                      <a:noFill/>
-                    </a:lnT>
-                    <a:lnB w="6350" cap="flat" cmpd="sng" algn="ctr">
-                      <a:solidFill>
-                        <a:schemeClr val="tx1"/>
-                      </a:solidFill>
-                      <a:prstDash val="solid"/>
-                      <a:round/>
-                      <a:headEnd type="none" w="med" len="med"/>
-                      <a:tailEnd type="none" w="med" len="med"/>
-                    </a:lnB>
-                    <a:lnTlToBr w="12700" cmpd="sng">
-                      <a:noFill/>
-                      <a:prstDash val="solid"/>
-                    </a:lnTlToBr>
-                    <a:lnBlToTr w="12700" cmpd="sng">
-                      <a:noFill/>
-                      <a:prstDash val="solid"/>
-                    </a:lnBlToTr>
-                    <a:solidFill>
-                      <a:schemeClr val="accent6"/>
-                    </a:solidFill>
-                  </a:tcPr>
-                </a:tc>
-                <a:tc>
-                  <a:txBody>
-                    <a:bodyPr/>
-                    <a:lstStyle/>
-                    <a:p>
-                      <a:pPr algn="r"/>
-                      <a:r>
-                        <a:rPr lang="de-CH" sz="600" dirty="0">
-                          <a:solidFill>
-                            <a:schemeClr val="accent1"/>
-                          </a:solidFill>
-                        </a:rPr>
-                        <a:t>98</a:t>
-                      </a:r>
-                    </a:p>
-                  </a:txBody>
-                  <a:tcPr marL="50911" marR="50911" marT="25456" marB="50912">
-                    <a:lnL w="12700" cmpd="sng">
-                      <a:noFill/>
-                    </a:lnL>
-                    <a:lnR w="12700" cmpd="sng">
-                      <a:noFill/>
-                    </a:lnR>
-                    <a:lnT w="12700" cmpd="sng">
-                      <a:noFill/>
-                    </a:lnT>
-                    <a:lnB w="6350" cap="flat" cmpd="sng" algn="ctr">
-                      <a:solidFill>
-                        <a:schemeClr val="tx1"/>
-                      </a:solidFill>
-                      <a:prstDash val="solid"/>
-                      <a:round/>
-                      <a:headEnd type="none" w="med" len="med"/>
-                      <a:tailEnd type="none" w="med" len="med"/>
-                    </a:lnB>
-                    <a:lnTlToBr w="12700" cmpd="sng">
-                      <a:noFill/>
-                      <a:prstDash val="solid"/>
-                    </a:lnTlToBr>
-                    <a:lnBlToTr w="12700" cmpd="sng">
-                      <a:noFill/>
-                      <a:prstDash val="solid"/>
-                    </a:lnBlToTr>
-                    <a:solidFill>
-                      <a:schemeClr val="accent5"/>
-                    </a:solidFill>
-                  </a:tcPr>
-                </a:tc>
-                <a:tc>
-                  <a:txBody>
-                    <a:bodyPr/>
-                    <a:lstStyle/>
-                    <a:p>
-                      <a:pPr algn="r"/>
-                      <a:r>
-                        <a:rPr lang="de-CH" sz="600" dirty="0">
-                          <a:solidFill>
-                            <a:schemeClr val="accent1"/>
-                          </a:solidFill>
-                        </a:rPr>
-                        <a:t>124</a:t>
-                      </a:r>
-                    </a:p>
-                  </a:txBody>
-                  <a:tcPr marL="50911" marR="50911" marT="25456" marB="50912">
-                    <a:lnL w="12700" cmpd="sng">
-                      <a:noFill/>
-                    </a:lnL>
-                    <a:lnR w="12700" cmpd="sng">
-                      <a:noFill/>
-                    </a:lnR>
-                    <a:lnT w="12700" cmpd="sng">
-                      <a:noFill/>
-                    </a:lnT>
-                    <a:lnB w="6350" cap="flat" cmpd="sng" algn="ctr">
-                      <a:solidFill>
-                        <a:schemeClr val="tx1"/>
-                      </a:solidFill>
-                      <a:prstDash val="solid"/>
-                      <a:round/>
-                      <a:headEnd type="none" w="med" len="med"/>
-                      <a:tailEnd type="none" w="med" len="med"/>
-                    </a:lnB>
-                    <a:lnTlToBr w="12700" cmpd="sng">
-                      <a:noFill/>
-                      <a:prstDash val="solid"/>
-                    </a:lnTlToBr>
-                    <a:lnBlToTr w="12700" cmpd="sng">
-                      <a:noFill/>
-                      <a:prstDash val="solid"/>
-                    </a:lnBlToTr>
-                    <a:solidFill>
-                      <a:schemeClr val="accent6"/>
-                    </a:solidFill>
-                  </a:tcPr>
-                </a:tc>
-                <a:tc>
-                  <a:txBody>
-                    <a:bodyPr/>
-                    <a:lstStyle/>
-                    <a:p>
-                      <a:pPr algn="r"/>
-                      <a:r>
-                        <a:rPr lang="de-CH" sz="600" dirty="0">
-                          <a:solidFill>
-                            <a:schemeClr val="accent1"/>
-                          </a:solidFill>
-                        </a:rPr>
-                        <a:t>119</a:t>
-                      </a:r>
-                    </a:p>
-                  </a:txBody>
-                  <a:tcPr marL="50911" marR="50911" marT="25456" marB="50912">
-                    <a:lnL w="12700" cmpd="sng">
-                      <a:noFill/>
-                    </a:lnL>
-                    <a:lnR w="12700" cmpd="sng">
-                      <a:noFill/>
-                    </a:lnR>
-                    <a:lnT w="12700" cmpd="sng">
-                      <a:noFill/>
-                    </a:lnT>
-                    <a:lnB w="6350" cap="flat" cmpd="sng" algn="ctr">
-                      <a:solidFill>
-                        <a:schemeClr val="tx1"/>
-                      </a:solidFill>
-                      <a:prstDash val="solid"/>
-                      <a:round/>
-                      <a:headEnd type="none" w="med" len="med"/>
-                      <a:tailEnd type="none" w="med" len="med"/>
-                    </a:lnB>
-                    <a:lnTlToBr w="12700" cmpd="sng">
-                      <a:noFill/>
-                      <a:prstDash val="solid"/>
-                    </a:lnTlToBr>
-                    <a:lnBlToTr w="12700" cmpd="sng">
-                      <a:noFill/>
-                      <a:prstDash val="solid"/>
-                    </a:lnBlToTr>
-                    <a:solidFill>
-                      <a:schemeClr val="accent5"/>
-                    </a:solidFill>
-                  </a:tcPr>
-                </a:tc>
-                <a:tc>
-                  <a:txBody>
-                    <a:bodyPr/>
-                    <a:lstStyle/>
-                    <a:p>
-                      <a:pPr algn="r"/>
-                      <a:r>
-                        <a:rPr lang="de-CH" sz="600" dirty="0">
-                          <a:solidFill>
-                            <a:schemeClr val="accent1"/>
-                          </a:solidFill>
-                        </a:rPr>
-                        <a:t>1218</a:t>
-                      </a:r>
-                    </a:p>
-                  </a:txBody>
-                  <a:tcPr marL="50911" marR="50911" marT="25456" marB="50912">
-                    <a:lnL w="12700" cmpd="sng">
-                      <a:noFill/>
-                    </a:lnL>
-                    <a:lnR w="12700" cmpd="sng">
-                      <a:noFill/>
-                    </a:lnR>
-                    <a:lnT w="12700" cmpd="sng">
-                      <a:noFill/>
-                    </a:lnT>
-                    <a:lnB w="6350" cap="flat" cmpd="sng" algn="ctr">
-                      <a:solidFill>
-                        <a:schemeClr val="tx1"/>
-                      </a:solidFill>
-                      <a:prstDash val="solid"/>
-                      <a:round/>
-                      <a:headEnd type="none" w="med" len="med"/>
-                      <a:tailEnd type="none" w="med" len="med"/>
-                    </a:lnB>
-                    <a:lnTlToBr w="12700" cmpd="sng">
-                      <a:noFill/>
-                      <a:prstDash val="solid"/>
-                    </a:lnTlToBr>
-                    <a:lnBlToTr w="12700" cmpd="sng">
-                      <a:noFill/>
-                      <a:prstDash val="solid"/>
-                    </a:lnBlToTr>
-                    <a:solidFill>
-                      <a:schemeClr val="accent6"/>
-                    </a:solidFill>
-                  </a:tcPr>
-                </a:tc>
-                <a:extLst>
-                  <a:ext uri="{0D108BD9-81ED-4DB2-BD59-A6C34878D82A}">
-                    <a16:rowId xmlns:a16="http://schemas.microsoft.com/office/drawing/2014/main" val="10000"/>
-                  </a:ext>
-                </a:extLst>
-              </a:tr>
-              <a:tr h="141027">
-                <a:tc>
-                  <a:txBody>
-                    <a:bodyPr/>
-                    <a:lstStyle/>
-                    <a:p>
-                      <a:r>
-                        <a:rPr lang="de-CH" sz="600" dirty="0">
-                          <a:solidFill>
-                            <a:schemeClr val="accent1"/>
-                          </a:solidFill>
-                        </a:rPr>
-                        <a:t>Table title </a:t>
-                      </a:r>
-                      <a:r>
-                        <a:rPr lang="de-CH" sz="600" dirty="0" err="1">
-                          <a:solidFill>
-                            <a:schemeClr val="accent1"/>
-                          </a:solidFill>
-                        </a:rPr>
-                        <a:t>left</a:t>
-                      </a:r>
-                      <a:endParaRPr lang="de-CH" sz="600" dirty="0">
-                        <a:solidFill>
-                          <a:schemeClr val="accent1"/>
-                        </a:solidFill>
-                      </a:endParaRPr>
-                    </a:p>
-                  </a:txBody>
-                  <a:tcPr marL="50911" marR="50911" marT="25456" marB="50912">
-                    <a:lnL w="12700" cmpd="sng">
-                      <a:noFill/>
-                    </a:lnL>
-                    <a:lnR w="12700" cmpd="sng">
-                      <a:noFill/>
-                    </a:lnR>
-                    <a:lnT w="6350" cap="flat" cmpd="sng" algn="ctr">
-                      <a:solidFill>
-                        <a:schemeClr val="tx1"/>
-                      </a:solidFill>
-                      <a:prstDash val="solid"/>
-                      <a:round/>
-                      <a:headEnd type="none" w="med" len="med"/>
-                      <a:tailEnd type="none" w="med" len="med"/>
-                    </a:lnT>
-                    <a:lnB w="6350" cap="flat" cmpd="sng" algn="ctr">
-                      <a:solidFill>
-                        <a:schemeClr val="tx1"/>
-                      </a:solidFill>
-                      <a:prstDash val="solid"/>
-                      <a:round/>
-                      <a:headEnd type="none" w="med" len="med"/>
-                      <a:tailEnd type="none" w="med" len="med"/>
-                    </a:lnB>
-                    <a:lnTlToBr w="12700" cmpd="sng">
-                      <a:noFill/>
-                      <a:prstDash val="solid"/>
-                    </a:lnTlToBr>
-                    <a:lnBlToTr w="12700" cmpd="sng">
-                      <a:noFill/>
-                      <a:prstDash val="solid"/>
-                    </a:lnBlToTr>
-                    <a:solidFill>
-                      <a:schemeClr val="accent6"/>
-                    </a:solidFill>
-                  </a:tcPr>
-                </a:tc>
-                <a:tc>
-                  <a:txBody>
-                    <a:bodyPr/>
-                    <a:lstStyle/>
-                    <a:p>
-                      <a:pPr algn="r"/>
-                      <a:r>
-                        <a:rPr lang="de-CH" sz="600" dirty="0">
-                          <a:solidFill>
-                            <a:schemeClr val="accent1"/>
-                          </a:solidFill>
-                        </a:rPr>
-                        <a:t>64</a:t>
-                      </a:r>
-                    </a:p>
-                  </a:txBody>
-                  <a:tcPr marL="50911" marR="50911" marT="25456" marB="50912">
-                    <a:lnL w="12700" cmpd="sng">
-                      <a:noFill/>
-                    </a:lnL>
-                    <a:lnR w="12700" cmpd="sng">
-                      <a:noFill/>
-                    </a:lnR>
-                    <a:lnT w="6350" cap="flat" cmpd="sng" algn="ctr">
-                      <a:solidFill>
-                        <a:schemeClr val="tx1"/>
-                      </a:solidFill>
-                      <a:prstDash val="solid"/>
-                      <a:round/>
-                      <a:headEnd type="none" w="med" len="med"/>
-                      <a:tailEnd type="none" w="med" len="med"/>
-                    </a:lnT>
-                    <a:lnB w="6350" cap="flat" cmpd="sng" algn="ctr">
-                      <a:solidFill>
-                        <a:schemeClr val="tx1"/>
-                      </a:solidFill>
-                      <a:prstDash val="solid"/>
-                      <a:round/>
-                      <a:headEnd type="none" w="med" len="med"/>
-                      <a:tailEnd type="none" w="med" len="med"/>
-                    </a:lnB>
-                    <a:lnTlToBr w="12700" cmpd="sng">
-                      <a:noFill/>
-                      <a:prstDash val="solid"/>
-                    </a:lnTlToBr>
-                    <a:lnBlToTr w="12700" cmpd="sng">
-                      <a:noFill/>
-                      <a:prstDash val="solid"/>
-                    </a:lnBlToTr>
-                    <a:solidFill>
-                      <a:schemeClr val="accent5"/>
-                    </a:solidFill>
-                  </a:tcPr>
-                </a:tc>
-                <a:tc>
-                  <a:txBody>
-                    <a:bodyPr/>
-                    <a:lstStyle/>
-                    <a:p>
-                      <a:pPr algn="r"/>
-                      <a:r>
-                        <a:rPr lang="de-CH" sz="600" dirty="0">
-                          <a:solidFill>
-                            <a:schemeClr val="accent1"/>
-                          </a:solidFill>
-                        </a:rPr>
-                        <a:t>64</a:t>
-                      </a:r>
-                    </a:p>
-                  </a:txBody>
-                  <a:tcPr marL="50911" marR="50911" marT="25456" marB="50912">
-                    <a:lnL w="12700" cmpd="sng">
-                      <a:noFill/>
-                    </a:lnL>
-                    <a:lnR w="12700" cmpd="sng">
-                      <a:noFill/>
-                    </a:lnR>
-                    <a:lnT w="6350" cap="flat" cmpd="sng" algn="ctr">
-                      <a:solidFill>
-                        <a:schemeClr val="tx1"/>
-                      </a:solidFill>
-                      <a:prstDash val="solid"/>
-                      <a:round/>
-                      <a:headEnd type="none" w="med" len="med"/>
-                      <a:tailEnd type="none" w="med" len="med"/>
-                    </a:lnT>
-                    <a:lnB w="6350" cap="flat" cmpd="sng" algn="ctr">
-                      <a:solidFill>
-                        <a:schemeClr val="tx1"/>
-                      </a:solidFill>
-                      <a:prstDash val="solid"/>
-                      <a:round/>
-                      <a:headEnd type="none" w="med" len="med"/>
-                      <a:tailEnd type="none" w="med" len="med"/>
-                    </a:lnB>
-                    <a:lnTlToBr w="12700" cmpd="sng">
-                      <a:noFill/>
-                      <a:prstDash val="solid"/>
-                    </a:lnTlToBr>
-                    <a:lnBlToTr w="12700" cmpd="sng">
-                      <a:noFill/>
-                      <a:prstDash val="solid"/>
-                    </a:lnBlToTr>
-                    <a:solidFill>
-                      <a:schemeClr val="accent6"/>
-                    </a:solidFill>
-                  </a:tcPr>
-                </a:tc>
-                <a:tc>
-                  <a:txBody>
-                    <a:bodyPr/>
-                    <a:lstStyle/>
-                    <a:p>
-                      <a:pPr algn="r"/>
-                      <a:r>
-                        <a:rPr lang="de-CH" sz="600" dirty="0">
-                          <a:solidFill>
-                            <a:schemeClr val="accent1"/>
-                          </a:solidFill>
-                        </a:rPr>
-                        <a:t>41</a:t>
-                      </a:r>
-                    </a:p>
-                  </a:txBody>
-                  <a:tcPr marL="50911" marR="50911" marT="25456" marB="50912">
-                    <a:lnL w="12700" cmpd="sng">
-                      <a:noFill/>
-                    </a:lnL>
-                    <a:lnR w="12700" cmpd="sng">
-                      <a:noFill/>
-                    </a:lnR>
-                    <a:lnT w="6350" cap="flat" cmpd="sng" algn="ctr">
-                      <a:solidFill>
-                        <a:schemeClr val="tx1"/>
-                      </a:solidFill>
-                      <a:prstDash val="solid"/>
-                      <a:round/>
-                      <a:headEnd type="none" w="med" len="med"/>
-                      <a:tailEnd type="none" w="med" len="med"/>
-                    </a:lnT>
-                    <a:lnB w="6350" cap="flat" cmpd="sng" algn="ctr">
-                      <a:solidFill>
-                        <a:schemeClr val="tx1"/>
-                      </a:solidFill>
-                      <a:prstDash val="solid"/>
-                      <a:round/>
-                      <a:headEnd type="none" w="med" len="med"/>
-                      <a:tailEnd type="none" w="med" len="med"/>
-                    </a:lnB>
-                    <a:lnTlToBr w="12700" cmpd="sng">
-                      <a:noFill/>
-                      <a:prstDash val="solid"/>
-                    </a:lnTlToBr>
-                    <a:lnBlToTr w="12700" cmpd="sng">
-                      <a:noFill/>
-                      <a:prstDash val="solid"/>
-                    </a:lnBlToTr>
-                    <a:solidFill>
-                      <a:schemeClr val="accent5"/>
-                    </a:solidFill>
-                  </a:tcPr>
-                </a:tc>
-                <a:tc>
-                  <a:txBody>
-                    <a:bodyPr/>
-                    <a:lstStyle/>
-                    <a:p>
-                      <a:pPr algn="r"/>
-                      <a:r>
-                        <a:rPr lang="de-CH" sz="600" dirty="0">
-                          <a:solidFill>
-                            <a:schemeClr val="accent1"/>
-                          </a:solidFill>
-                        </a:rPr>
-                        <a:t>14</a:t>
-                      </a:r>
-                    </a:p>
-                  </a:txBody>
-                  <a:tcPr marL="50911" marR="50911" marT="25456" marB="50912">
-                    <a:lnL w="12700" cmpd="sng">
-                      <a:noFill/>
-                    </a:lnL>
-                    <a:lnR w="12700" cmpd="sng">
-                      <a:noFill/>
-                    </a:lnR>
-                    <a:lnT w="6350" cap="flat" cmpd="sng" algn="ctr">
-                      <a:solidFill>
-                        <a:schemeClr val="tx1"/>
-                      </a:solidFill>
-                      <a:prstDash val="solid"/>
-                      <a:round/>
-                      <a:headEnd type="none" w="med" len="med"/>
-                      <a:tailEnd type="none" w="med" len="med"/>
-                    </a:lnT>
-                    <a:lnB w="6350" cap="flat" cmpd="sng" algn="ctr">
-                      <a:solidFill>
-                        <a:schemeClr val="tx1"/>
-                      </a:solidFill>
-                      <a:prstDash val="solid"/>
-                      <a:round/>
-                      <a:headEnd type="none" w="med" len="med"/>
-                      <a:tailEnd type="none" w="med" len="med"/>
-                    </a:lnB>
-                    <a:lnTlToBr w="12700" cmpd="sng">
-                      <a:noFill/>
-                      <a:prstDash val="solid"/>
-                    </a:lnTlToBr>
-                    <a:lnBlToTr w="12700" cmpd="sng">
-                      <a:noFill/>
-                      <a:prstDash val="solid"/>
-                    </a:lnBlToTr>
-                    <a:solidFill>
-                      <a:schemeClr val="accent6"/>
-                    </a:solidFill>
-                  </a:tcPr>
-                </a:tc>
-                <a:tc>
-                  <a:txBody>
-                    <a:bodyPr/>
-                    <a:lstStyle/>
-                    <a:p>
-                      <a:pPr algn="r"/>
-                      <a:r>
-                        <a:rPr lang="de-CH" sz="600" dirty="0">
-                          <a:solidFill>
-                            <a:schemeClr val="accent1"/>
-                          </a:solidFill>
-                        </a:rPr>
-                        <a:t>22</a:t>
-                      </a:r>
-                    </a:p>
-                  </a:txBody>
-                  <a:tcPr marL="50911" marR="50911" marT="25456" marB="50912">
-                    <a:lnL w="12700" cmpd="sng">
-                      <a:noFill/>
-                    </a:lnL>
-                    <a:lnR w="12700" cmpd="sng">
-                      <a:noFill/>
-                    </a:lnR>
-                    <a:lnT w="6350" cap="flat" cmpd="sng" algn="ctr">
-                      <a:solidFill>
-                        <a:schemeClr val="tx1"/>
-                      </a:solidFill>
-                      <a:prstDash val="solid"/>
-                      <a:round/>
-                      <a:headEnd type="none" w="med" len="med"/>
-                      <a:tailEnd type="none" w="med" len="med"/>
-                    </a:lnT>
-                    <a:lnB w="6350" cap="flat" cmpd="sng" algn="ctr">
-                      <a:solidFill>
-                        <a:schemeClr val="tx1"/>
-                      </a:solidFill>
-                      <a:prstDash val="solid"/>
-                      <a:round/>
-                      <a:headEnd type="none" w="med" len="med"/>
-                      <a:tailEnd type="none" w="med" len="med"/>
-                    </a:lnB>
-                    <a:lnTlToBr w="12700" cmpd="sng">
-                      <a:noFill/>
-                      <a:prstDash val="solid"/>
-                    </a:lnTlToBr>
-                    <a:lnBlToTr w="12700" cmpd="sng">
-                      <a:noFill/>
-                      <a:prstDash val="solid"/>
-                    </a:lnBlToTr>
-                    <a:solidFill>
-                      <a:schemeClr val="accent5"/>
-                    </a:solidFill>
-                  </a:tcPr>
-                </a:tc>
-                <a:tc>
-                  <a:txBody>
-                    <a:bodyPr/>
-                    <a:lstStyle/>
-                    <a:p>
-                      <a:pPr algn="r"/>
-                      <a:r>
-                        <a:rPr lang="de-CH" sz="600" dirty="0">
-                          <a:solidFill>
-                            <a:schemeClr val="accent1"/>
-                          </a:solidFill>
-                        </a:rPr>
-                        <a:t>45</a:t>
-                      </a:r>
-                    </a:p>
-                  </a:txBody>
-                  <a:tcPr marL="50911" marR="50911" marT="25456" marB="50912">
-                    <a:lnL w="12700" cmpd="sng">
-                      <a:noFill/>
-                    </a:lnL>
-                    <a:lnR w="12700" cmpd="sng">
-                      <a:noFill/>
-                    </a:lnR>
-                    <a:lnT w="6350" cap="flat" cmpd="sng" algn="ctr">
-                      <a:solidFill>
-                        <a:schemeClr val="tx1"/>
-                      </a:solidFill>
-                      <a:prstDash val="solid"/>
-                      <a:round/>
-                      <a:headEnd type="none" w="med" len="med"/>
-                      <a:tailEnd type="none" w="med" len="med"/>
-                    </a:lnT>
-                    <a:lnB w="6350" cap="flat" cmpd="sng" algn="ctr">
-                      <a:solidFill>
-                        <a:schemeClr val="tx1"/>
-                      </a:solidFill>
-                      <a:prstDash val="solid"/>
-                      <a:round/>
-                      <a:headEnd type="none" w="med" len="med"/>
-                      <a:tailEnd type="none" w="med" len="med"/>
-                    </a:lnB>
-                    <a:lnTlToBr w="12700" cmpd="sng">
-                      <a:noFill/>
-                      <a:prstDash val="solid"/>
-                    </a:lnTlToBr>
-                    <a:lnBlToTr w="12700" cmpd="sng">
-                      <a:noFill/>
-                      <a:prstDash val="solid"/>
-                    </a:lnBlToTr>
-                    <a:solidFill>
-                      <a:schemeClr val="accent6"/>
-                    </a:solidFill>
-                  </a:tcPr>
-                </a:tc>
-                <a:tc>
-                  <a:txBody>
-                    <a:bodyPr/>
-                    <a:lstStyle/>
-                    <a:p>
-                      <a:pPr algn="r"/>
-                      <a:r>
-                        <a:rPr lang="de-CH" sz="600" dirty="0">
-                          <a:solidFill>
-                            <a:schemeClr val="accent1"/>
-                          </a:solidFill>
-                        </a:rPr>
-                        <a:t>73</a:t>
-                      </a:r>
-                    </a:p>
-                  </a:txBody>
-                  <a:tcPr marL="50911" marR="50911" marT="25456" marB="50912">
-                    <a:lnL w="12700" cmpd="sng">
-                      <a:noFill/>
-                    </a:lnL>
-                    <a:lnR w="12700" cmpd="sng">
-                      <a:noFill/>
-                    </a:lnR>
-                    <a:lnT w="6350" cap="flat" cmpd="sng" algn="ctr">
-                      <a:solidFill>
-                        <a:schemeClr val="tx1"/>
-                      </a:solidFill>
-                      <a:prstDash val="solid"/>
-                      <a:round/>
-                      <a:headEnd type="none" w="med" len="med"/>
-                      <a:tailEnd type="none" w="med" len="med"/>
-                    </a:lnT>
-                    <a:lnB w="6350" cap="flat" cmpd="sng" algn="ctr">
-                      <a:solidFill>
-                        <a:schemeClr val="tx1"/>
-                      </a:solidFill>
-                      <a:prstDash val="solid"/>
-                      <a:round/>
-                      <a:headEnd type="none" w="med" len="med"/>
-                      <a:tailEnd type="none" w="med" len="med"/>
-                    </a:lnB>
-                    <a:lnTlToBr w="12700" cmpd="sng">
-                      <a:noFill/>
-                      <a:prstDash val="solid"/>
-                    </a:lnTlToBr>
-                    <a:lnBlToTr w="12700" cmpd="sng">
-                      <a:noFill/>
-                      <a:prstDash val="solid"/>
-                    </a:lnBlToTr>
-                    <a:solidFill>
-                      <a:schemeClr val="accent5"/>
-                    </a:solidFill>
-                  </a:tcPr>
-                </a:tc>
-                <a:tc>
-                  <a:txBody>
-                    <a:bodyPr/>
-                    <a:lstStyle/>
-                    <a:p>
-                      <a:pPr algn="r"/>
-                      <a:r>
-                        <a:rPr lang="de-CH" sz="600" dirty="0">
-                          <a:solidFill>
-                            <a:schemeClr val="accent1"/>
-                          </a:solidFill>
-                        </a:rPr>
-                        <a:t>415</a:t>
-                      </a:r>
-                    </a:p>
-                  </a:txBody>
-                  <a:tcPr marL="50911" marR="50911" marT="25456" marB="50912">
-                    <a:lnL w="12700" cmpd="sng">
-                      <a:noFill/>
-                    </a:lnL>
-                    <a:lnR w="12700" cmpd="sng">
-                      <a:noFill/>
-                    </a:lnR>
-                    <a:lnT w="6350" cap="flat" cmpd="sng" algn="ctr">
-                      <a:solidFill>
-                        <a:schemeClr val="tx1"/>
-                      </a:solidFill>
-                      <a:prstDash val="solid"/>
-                      <a:round/>
-                      <a:headEnd type="none" w="med" len="med"/>
-                      <a:tailEnd type="none" w="med" len="med"/>
-                    </a:lnT>
-                    <a:lnB w="6350" cap="flat" cmpd="sng" algn="ctr">
-                      <a:solidFill>
-                        <a:schemeClr val="tx1"/>
-                      </a:solidFill>
-                      <a:prstDash val="solid"/>
-                      <a:round/>
-                      <a:headEnd type="none" w="med" len="med"/>
-                      <a:tailEnd type="none" w="med" len="med"/>
-                    </a:lnB>
-                    <a:lnTlToBr w="12700" cmpd="sng">
-                      <a:noFill/>
-                      <a:prstDash val="solid"/>
-                    </a:lnTlToBr>
-                    <a:lnBlToTr w="12700" cmpd="sng">
-                      <a:noFill/>
-                      <a:prstDash val="solid"/>
-                    </a:lnBlToTr>
-                    <a:solidFill>
-                      <a:schemeClr val="accent6"/>
-                    </a:solidFill>
-                  </a:tcPr>
-                </a:tc>
-                <a:extLst>
-                  <a:ext uri="{0D108BD9-81ED-4DB2-BD59-A6C34878D82A}">
-                    <a16:rowId xmlns:a16="http://schemas.microsoft.com/office/drawing/2014/main" val="10001"/>
-                  </a:ext>
-                </a:extLst>
-              </a:tr>
-              <a:tr h="141027">
-                <a:tc>
-                  <a:txBody>
-                    <a:bodyPr/>
-                    <a:lstStyle/>
-                    <a:p>
-                      <a:r>
-                        <a:rPr lang="de-CH" sz="600" dirty="0">
-                          <a:solidFill>
-                            <a:schemeClr val="accent1"/>
-                          </a:solidFill>
-                        </a:rPr>
-                        <a:t>Table title </a:t>
-                      </a:r>
-                      <a:r>
-                        <a:rPr lang="de-CH" sz="600" dirty="0" err="1">
-                          <a:solidFill>
-                            <a:schemeClr val="accent1"/>
-                          </a:solidFill>
-                        </a:rPr>
-                        <a:t>left</a:t>
-                      </a:r>
-                      <a:endParaRPr lang="de-CH" sz="600" dirty="0">
-                        <a:solidFill>
-                          <a:schemeClr val="accent1"/>
-                        </a:solidFill>
-                      </a:endParaRPr>
-                    </a:p>
-                  </a:txBody>
-                  <a:tcPr marL="50911" marR="50911" marT="25456" marB="50912">
-                    <a:lnL w="12700" cmpd="sng">
-                      <a:noFill/>
-                    </a:lnL>
-                    <a:lnR w="12700" cmpd="sng">
-                      <a:noFill/>
-                    </a:lnR>
-                    <a:lnT w="6350" cap="flat" cmpd="sng" algn="ctr">
-                      <a:solidFill>
-                        <a:schemeClr val="tx1"/>
-                      </a:solidFill>
-                      <a:prstDash val="solid"/>
-                      <a:round/>
-                      <a:headEnd type="none" w="med" len="med"/>
-                      <a:tailEnd type="none" w="med" len="med"/>
-                    </a:lnT>
-                    <a:lnB w="6350" cap="flat" cmpd="sng" algn="ctr">
-                      <a:solidFill>
-                        <a:schemeClr val="tx1"/>
-                      </a:solidFill>
-                      <a:prstDash val="solid"/>
-                      <a:round/>
-                      <a:headEnd type="none" w="med" len="med"/>
-                      <a:tailEnd type="none" w="med" len="med"/>
-                    </a:lnB>
-                    <a:lnTlToBr w="12700" cmpd="sng">
-                      <a:noFill/>
-                      <a:prstDash val="solid"/>
-                    </a:lnTlToBr>
-                    <a:lnBlToTr w="12700" cmpd="sng">
-                      <a:noFill/>
-                      <a:prstDash val="solid"/>
-                    </a:lnBlToTr>
-                    <a:solidFill>
-                      <a:schemeClr val="accent6"/>
-                    </a:solidFill>
-                  </a:tcPr>
-                </a:tc>
-                <a:tc>
-                  <a:txBody>
-                    <a:bodyPr/>
-                    <a:lstStyle/>
-                    <a:p>
-                      <a:pPr algn="r"/>
-                      <a:r>
-                        <a:rPr lang="de-CH" sz="600" dirty="0">
-                          <a:solidFill>
-                            <a:schemeClr val="accent1"/>
-                          </a:solidFill>
-                        </a:rPr>
-                        <a:t>51</a:t>
-                      </a:r>
-                    </a:p>
-                  </a:txBody>
-                  <a:tcPr marL="50911" marR="50911" marT="25456" marB="50912">
-                    <a:lnL w="12700" cmpd="sng">
-                      <a:noFill/>
-                    </a:lnL>
-                    <a:lnR w="12700" cmpd="sng">
-                      <a:noFill/>
-                    </a:lnR>
-                    <a:lnT w="6350" cap="flat" cmpd="sng" algn="ctr">
-                      <a:solidFill>
-                        <a:schemeClr val="tx1"/>
-                      </a:solidFill>
-                      <a:prstDash val="solid"/>
-                      <a:round/>
-                      <a:headEnd type="none" w="med" len="med"/>
-                      <a:tailEnd type="none" w="med" len="med"/>
-                    </a:lnT>
-                    <a:lnB w="6350" cap="flat" cmpd="sng" algn="ctr">
-                      <a:solidFill>
-                        <a:schemeClr val="tx1"/>
-                      </a:solidFill>
-                      <a:prstDash val="solid"/>
-                      <a:round/>
-                      <a:headEnd type="none" w="med" len="med"/>
-                      <a:tailEnd type="none" w="med" len="med"/>
-                    </a:lnB>
-                    <a:lnTlToBr w="12700" cmpd="sng">
-                      <a:noFill/>
-                      <a:prstDash val="solid"/>
-                    </a:lnTlToBr>
-                    <a:lnBlToTr w="12700" cmpd="sng">
-                      <a:noFill/>
-                      <a:prstDash val="solid"/>
-                    </a:lnBlToTr>
-                    <a:solidFill>
-                      <a:schemeClr val="accent5"/>
-                    </a:solidFill>
-                  </a:tcPr>
-                </a:tc>
-                <a:tc>
-                  <a:txBody>
-                    <a:bodyPr/>
-                    <a:lstStyle/>
-                    <a:p>
-                      <a:pPr algn="r"/>
-                      <a:r>
-                        <a:rPr lang="de-CH" sz="600" dirty="0">
-                          <a:solidFill>
-                            <a:schemeClr val="accent1"/>
-                          </a:solidFill>
-                        </a:rPr>
-                        <a:t>5</a:t>
-                      </a:r>
-                    </a:p>
-                  </a:txBody>
-                  <a:tcPr marL="50911" marR="50911" marT="25456" marB="50912">
-                    <a:lnL w="12700" cmpd="sng">
-                      <a:noFill/>
-                    </a:lnL>
-                    <a:lnR w="12700" cmpd="sng">
-                      <a:noFill/>
-                    </a:lnR>
-                    <a:lnT w="6350" cap="flat" cmpd="sng" algn="ctr">
-                      <a:solidFill>
-                        <a:schemeClr val="tx1"/>
-                      </a:solidFill>
-                      <a:prstDash val="solid"/>
-                      <a:round/>
-                      <a:headEnd type="none" w="med" len="med"/>
-                      <a:tailEnd type="none" w="med" len="med"/>
-                    </a:lnT>
-                    <a:lnB w="6350" cap="flat" cmpd="sng" algn="ctr">
-                      <a:solidFill>
-                        <a:schemeClr val="tx1"/>
-                      </a:solidFill>
-                      <a:prstDash val="solid"/>
-                      <a:round/>
-                      <a:headEnd type="none" w="med" len="med"/>
-                      <a:tailEnd type="none" w="med" len="med"/>
-                    </a:lnB>
-                    <a:lnTlToBr w="12700" cmpd="sng">
-                      <a:noFill/>
-                      <a:prstDash val="solid"/>
-                    </a:lnTlToBr>
-                    <a:lnBlToTr w="12700" cmpd="sng">
-                      <a:noFill/>
-                      <a:prstDash val="solid"/>
-                    </a:lnBlToTr>
-                    <a:solidFill>
-                      <a:schemeClr val="accent6"/>
-                    </a:solidFill>
-                  </a:tcPr>
-                </a:tc>
-                <a:tc>
-                  <a:txBody>
-                    <a:bodyPr/>
-                    <a:lstStyle/>
-                    <a:p>
-                      <a:pPr algn="r"/>
-                      <a:r>
-                        <a:rPr lang="de-CH" sz="600" dirty="0">
-                          <a:solidFill>
-                            <a:schemeClr val="accent1"/>
-                          </a:solidFill>
-                        </a:rPr>
-                        <a:t>1</a:t>
-                      </a:r>
-                    </a:p>
-                  </a:txBody>
-                  <a:tcPr marL="50911" marR="50911" marT="25456" marB="50912">
-                    <a:lnL w="12700" cmpd="sng">
-                      <a:noFill/>
-                    </a:lnL>
-                    <a:lnR w="12700" cmpd="sng">
-                      <a:noFill/>
-                    </a:lnR>
-                    <a:lnT w="6350" cap="flat" cmpd="sng" algn="ctr">
-                      <a:solidFill>
-                        <a:schemeClr val="tx1"/>
-                      </a:solidFill>
-                      <a:prstDash val="solid"/>
-                      <a:round/>
-                      <a:headEnd type="none" w="med" len="med"/>
-                      <a:tailEnd type="none" w="med" len="med"/>
-                    </a:lnT>
-                    <a:lnB w="6350" cap="flat" cmpd="sng" algn="ctr">
-                      <a:solidFill>
-                        <a:schemeClr val="tx1"/>
-                      </a:solidFill>
-                      <a:prstDash val="solid"/>
-                      <a:round/>
-                      <a:headEnd type="none" w="med" len="med"/>
-                      <a:tailEnd type="none" w="med" len="med"/>
-                    </a:lnB>
-                    <a:lnTlToBr w="12700" cmpd="sng">
-                      <a:noFill/>
-                      <a:prstDash val="solid"/>
-                    </a:lnTlToBr>
-                    <a:lnBlToTr w="12700" cmpd="sng">
-                      <a:noFill/>
-                      <a:prstDash val="solid"/>
-                    </a:lnBlToTr>
-                    <a:solidFill>
-                      <a:schemeClr val="accent5"/>
-                    </a:solidFill>
-                  </a:tcPr>
-                </a:tc>
-                <a:tc>
-                  <a:txBody>
-                    <a:bodyPr/>
-                    <a:lstStyle/>
-                    <a:p>
-                      <a:pPr algn="r"/>
-                      <a:r>
-                        <a:rPr lang="de-CH" sz="600" dirty="0">
-                          <a:solidFill>
-                            <a:schemeClr val="accent1"/>
-                          </a:solidFill>
-                        </a:rPr>
-                        <a:t>32</a:t>
-                      </a:r>
-                    </a:p>
-                  </a:txBody>
-                  <a:tcPr marL="50911" marR="50911" marT="25456" marB="50912">
-                    <a:lnL w="12700" cmpd="sng">
-                      <a:noFill/>
-                    </a:lnL>
-                    <a:lnR w="12700" cmpd="sng">
-                      <a:noFill/>
-                    </a:lnR>
-                    <a:lnT w="6350" cap="flat" cmpd="sng" algn="ctr">
-                      <a:solidFill>
-                        <a:schemeClr val="tx1"/>
-                      </a:solidFill>
-                      <a:prstDash val="solid"/>
-                      <a:round/>
-                      <a:headEnd type="none" w="med" len="med"/>
-                      <a:tailEnd type="none" w="med" len="med"/>
-                    </a:lnT>
-                    <a:lnB w="6350" cap="flat" cmpd="sng" algn="ctr">
-                      <a:solidFill>
-                        <a:schemeClr val="tx1"/>
-                      </a:solidFill>
-                      <a:prstDash val="solid"/>
-                      <a:round/>
-                      <a:headEnd type="none" w="med" len="med"/>
-                      <a:tailEnd type="none" w="med" len="med"/>
-                    </a:lnB>
-                    <a:lnTlToBr w="12700" cmpd="sng">
-                      <a:noFill/>
-                      <a:prstDash val="solid"/>
-                    </a:lnTlToBr>
-                    <a:lnBlToTr w="12700" cmpd="sng">
-                      <a:noFill/>
-                      <a:prstDash val="solid"/>
-                    </a:lnBlToTr>
-                    <a:solidFill>
-                      <a:schemeClr val="accent6"/>
-                    </a:solidFill>
-                  </a:tcPr>
-                </a:tc>
-                <a:tc>
-                  <a:txBody>
-                    <a:bodyPr/>
-                    <a:lstStyle/>
-                    <a:p>
-                      <a:pPr algn="r"/>
-                      <a:r>
-                        <a:rPr lang="de-CH" sz="600" dirty="0">
-                          <a:solidFill>
-                            <a:schemeClr val="accent1"/>
-                          </a:solidFill>
-                        </a:rPr>
-                        <a:t>22</a:t>
-                      </a:r>
-                    </a:p>
-                  </a:txBody>
-                  <a:tcPr marL="50911" marR="50911" marT="25456" marB="50912">
-                    <a:lnL w="12700" cmpd="sng">
-                      <a:noFill/>
-                    </a:lnL>
-                    <a:lnR w="12700" cmpd="sng">
-                      <a:noFill/>
-                    </a:lnR>
-                    <a:lnT w="6350" cap="flat" cmpd="sng" algn="ctr">
-                      <a:solidFill>
-                        <a:schemeClr val="tx1"/>
-                      </a:solidFill>
-                      <a:prstDash val="solid"/>
-                      <a:round/>
-                      <a:headEnd type="none" w="med" len="med"/>
-                      <a:tailEnd type="none" w="med" len="med"/>
-                    </a:lnT>
-                    <a:lnB w="6350" cap="flat" cmpd="sng" algn="ctr">
-                      <a:solidFill>
-                        <a:schemeClr val="tx1"/>
-                      </a:solidFill>
-                      <a:prstDash val="solid"/>
-                      <a:round/>
-                      <a:headEnd type="none" w="med" len="med"/>
-                      <a:tailEnd type="none" w="med" len="med"/>
-                    </a:lnB>
-                    <a:lnTlToBr w="12700" cmpd="sng">
-                      <a:noFill/>
-                      <a:prstDash val="solid"/>
-                    </a:lnTlToBr>
-                    <a:lnBlToTr w="12700" cmpd="sng">
-                      <a:noFill/>
-                      <a:prstDash val="solid"/>
-                    </a:lnBlToTr>
-                    <a:solidFill>
-                      <a:schemeClr val="accent5"/>
-                    </a:solidFill>
-                  </a:tcPr>
-                </a:tc>
-                <a:tc>
-                  <a:txBody>
-                    <a:bodyPr/>
-                    <a:lstStyle/>
-                    <a:p>
-                      <a:pPr algn="r"/>
-                      <a:r>
-                        <a:rPr lang="de-CH" sz="600" dirty="0">
-                          <a:solidFill>
-                            <a:schemeClr val="accent1"/>
-                          </a:solidFill>
-                        </a:rPr>
-                        <a:t>45</a:t>
-                      </a:r>
-                    </a:p>
-                  </a:txBody>
-                  <a:tcPr marL="50911" marR="50911" marT="25456" marB="50912">
-                    <a:lnL w="12700" cmpd="sng">
-                      <a:noFill/>
-                    </a:lnL>
-                    <a:lnR w="12700" cmpd="sng">
-                      <a:noFill/>
-                    </a:lnR>
-                    <a:lnT w="6350" cap="flat" cmpd="sng" algn="ctr">
-                      <a:solidFill>
-                        <a:schemeClr val="tx1"/>
-                      </a:solidFill>
-                      <a:prstDash val="solid"/>
-                      <a:round/>
-                      <a:headEnd type="none" w="med" len="med"/>
-                      <a:tailEnd type="none" w="med" len="med"/>
-                    </a:lnT>
-                    <a:lnB w="6350" cap="flat" cmpd="sng" algn="ctr">
-                      <a:solidFill>
-                        <a:schemeClr val="tx1"/>
-                      </a:solidFill>
-                      <a:prstDash val="solid"/>
-                      <a:round/>
-                      <a:headEnd type="none" w="med" len="med"/>
-                      <a:tailEnd type="none" w="med" len="med"/>
-                    </a:lnB>
-                    <a:lnTlToBr w="12700" cmpd="sng">
-                      <a:noFill/>
-                      <a:prstDash val="solid"/>
-                    </a:lnTlToBr>
-                    <a:lnBlToTr w="12700" cmpd="sng">
-                      <a:noFill/>
-                      <a:prstDash val="solid"/>
-                    </a:lnBlToTr>
-                    <a:solidFill>
-                      <a:schemeClr val="accent6"/>
-                    </a:solidFill>
-                  </a:tcPr>
-                </a:tc>
-                <a:tc>
-                  <a:txBody>
-                    <a:bodyPr/>
-                    <a:lstStyle/>
-                    <a:p>
-                      <a:pPr algn="r"/>
-                      <a:r>
-                        <a:rPr lang="de-CH" sz="600" dirty="0">
-                          <a:solidFill>
-                            <a:schemeClr val="accent1"/>
-                          </a:solidFill>
-                        </a:rPr>
-                        <a:t>73</a:t>
-                      </a:r>
-                    </a:p>
-                  </a:txBody>
-                  <a:tcPr marL="50911" marR="50911" marT="25456" marB="50912">
-                    <a:lnL w="12700" cmpd="sng">
-                      <a:noFill/>
-                    </a:lnL>
-                    <a:lnR w="12700" cmpd="sng">
-                      <a:noFill/>
-                    </a:lnR>
-                    <a:lnT w="6350" cap="flat" cmpd="sng" algn="ctr">
-                      <a:solidFill>
-                        <a:schemeClr val="tx1"/>
-                      </a:solidFill>
-                      <a:prstDash val="solid"/>
-                      <a:round/>
-                      <a:headEnd type="none" w="med" len="med"/>
-                      <a:tailEnd type="none" w="med" len="med"/>
-                    </a:lnT>
-                    <a:lnB w="6350" cap="flat" cmpd="sng" algn="ctr">
-                      <a:solidFill>
-                        <a:schemeClr val="tx1"/>
-                      </a:solidFill>
-                      <a:prstDash val="solid"/>
-                      <a:round/>
-                      <a:headEnd type="none" w="med" len="med"/>
-                      <a:tailEnd type="none" w="med" len="med"/>
-                    </a:lnB>
-                    <a:lnTlToBr w="12700" cmpd="sng">
-                      <a:noFill/>
-                      <a:prstDash val="solid"/>
-                    </a:lnTlToBr>
-                    <a:lnBlToTr w="12700" cmpd="sng">
-                      <a:noFill/>
-                      <a:prstDash val="solid"/>
-                    </a:lnBlToTr>
-                    <a:solidFill>
-                      <a:schemeClr val="accent5"/>
-                    </a:solidFill>
-                  </a:tcPr>
-                </a:tc>
-                <a:tc>
-                  <a:txBody>
-                    <a:bodyPr/>
-                    <a:lstStyle/>
-                    <a:p>
-                      <a:pPr algn="r"/>
-                      <a:r>
-                        <a:rPr lang="de-CH" sz="600" dirty="0">
-                          <a:solidFill>
-                            <a:schemeClr val="accent1"/>
-                          </a:solidFill>
-                        </a:rPr>
-                        <a:t>182</a:t>
-                      </a:r>
-                    </a:p>
-                  </a:txBody>
-                  <a:tcPr marL="50911" marR="50911" marT="25456" marB="50912">
-                    <a:lnL w="12700" cmpd="sng">
-                      <a:noFill/>
-                    </a:lnL>
-                    <a:lnR w="12700" cmpd="sng">
-                      <a:noFill/>
-                    </a:lnR>
-                    <a:lnT w="6350" cap="flat" cmpd="sng" algn="ctr">
-                      <a:solidFill>
-                        <a:schemeClr val="tx1"/>
-                      </a:solidFill>
-                      <a:prstDash val="solid"/>
-                      <a:round/>
-                      <a:headEnd type="none" w="med" len="med"/>
-                      <a:tailEnd type="none" w="med" len="med"/>
-                    </a:lnT>
-                    <a:lnB w="6350" cap="flat" cmpd="sng" algn="ctr">
-                      <a:solidFill>
-                        <a:schemeClr val="tx1"/>
-                      </a:solidFill>
-                      <a:prstDash val="solid"/>
-                      <a:round/>
-                      <a:headEnd type="none" w="med" len="med"/>
-                      <a:tailEnd type="none" w="med" len="med"/>
-                    </a:lnB>
-                    <a:lnTlToBr w="12700" cmpd="sng">
-                      <a:noFill/>
-                      <a:prstDash val="solid"/>
-                    </a:lnTlToBr>
-                    <a:lnBlToTr w="12700" cmpd="sng">
-                      <a:noFill/>
-                      <a:prstDash val="solid"/>
-                    </a:lnBlToTr>
-                    <a:solidFill>
-                      <a:schemeClr val="accent6"/>
-                    </a:solidFill>
-                  </a:tcPr>
-                </a:tc>
-                <a:extLst>
-                  <a:ext uri="{0D108BD9-81ED-4DB2-BD59-A6C34878D82A}">
-                    <a16:rowId xmlns:a16="http://schemas.microsoft.com/office/drawing/2014/main" val="10002"/>
-                  </a:ext>
-                </a:extLst>
-              </a:tr>
-              <a:tr h="141027">
-                <a:tc>
-                  <a:txBody>
-                    <a:bodyPr/>
-                    <a:lstStyle/>
-                    <a:p>
-                      <a:r>
-                        <a:rPr lang="de-CH" sz="600" dirty="0">
-                          <a:solidFill>
-                            <a:schemeClr val="accent1"/>
-                          </a:solidFill>
-                        </a:rPr>
-                        <a:t>Table title </a:t>
-                      </a:r>
-                      <a:r>
-                        <a:rPr lang="de-CH" sz="600" dirty="0" err="1">
-                          <a:solidFill>
-                            <a:schemeClr val="accent1"/>
-                          </a:solidFill>
-                        </a:rPr>
-                        <a:t>left</a:t>
-                      </a:r>
-                      <a:endParaRPr lang="de-CH" sz="600" dirty="0">
-                        <a:solidFill>
-                          <a:schemeClr val="accent1"/>
-                        </a:solidFill>
-                      </a:endParaRPr>
-                    </a:p>
-                  </a:txBody>
-                  <a:tcPr marL="50911" marR="50911" marT="25456" marB="50912">
-                    <a:lnL w="12700" cmpd="sng">
-                      <a:noFill/>
-                    </a:lnL>
-                    <a:lnR w="12700" cmpd="sng">
-                      <a:noFill/>
-                    </a:lnR>
-                    <a:lnT w="6350" cap="flat" cmpd="sng" algn="ctr">
-                      <a:solidFill>
-                        <a:schemeClr val="tx1"/>
-                      </a:solidFill>
-                      <a:prstDash val="solid"/>
-                      <a:round/>
-                      <a:headEnd type="none" w="med" len="med"/>
-                      <a:tailEnd type="none" w="med" len="med"/>
-                    </a:lnT>
-                    <a:lnB w="6350" cap="flat" cmpd="sng" algn="ctr">
-                      <a:solidFill>
-                        <a:schemeClr val="tx1"/>
-                      </a:solidFill>
-                      <a:prstDash val="solid"/>
-                      <a:round/>
-                      <a:headEnd type="none" w="med" len="med"/>
-                      <a:tailEnd type="none" w="med" len="med"/>
-                    </a:lnB>
-                    <a:lnTlToBr w="12700" cmpd="sng">
-                      <a:noFill/>
-                      <a:prstDash val="solid"/>
-                    </a:lnTlToBr>
-                    <a:lnBlToTr w="12700" cmpd="sng">
-                      <a:noFill/>
-                      <a:prstDash val="solid"/>
-                    </a:lnBlToTr>
-                    <a:solidFill>
-                      <a:schemeClr val="accent6"/>
-                    </a:solidFill>
-                  </a:tcPr>
-                </a:tc>
-                <a:tc>
-                  <a:txBody>
-                    <a:bodyPr/>
-                    <a:lstStyle/>
-                    <a:p>
-                      <a:pPr algn="r"/>
-                      <a:r>
-                        <a:rPr lang="de-CH" sz="600" dirty="0">
-                          <a:solidFill>
-                            <a:schemeClr val="accent1"/>
-                          </a:solidFill>
-                        </a:rPr>
-                        <a:t>38</a:t>
-                      </a:r>
-                    </a:p>
-                  </a:txBody>
-                  <a:tcPr marL="50911" marR="50911" marT="25456" marB="50912">
-                    <a:lnL w="12700" cmpd="sng">
-                      <a:noFill/>
-                    </a:lnL>
-                    <a:lnR w="12700" cmpd="sng">
-                      <a:noFill/>
-                    </a:lnR>
-                    <a:lnT w="6350" cap="flat" cmpd="sng" algn="ctr">
-                      <a:solidFill>
-                        <a:schemeClr val="tx1"/>
-                      </a:solidFill>
-                      <a:prstDash val="solid"/>
-                      <a:round/>
-                      <a:headEnd type="none" w="med" len="med"/>
-                      <a:tailEnd type="none" w="med" len="med"/>
-                    </a:lnT>
-                    <a:lnB w="6350" cap="flat" cmpd="sng" algn="ctr">
-                      <a:solidFill>
-                        <a:schemeClr val="tx1"/>
-                      </a:solidFill>
-                      <a:prstDash val="solid"/>
-                      <a:round/>
-                      <a:headEnd type="none" w="med" len="med"/>
-                      <a:tailEnd type="none" w="med" len="med"/>
-                    </a:lnB>
-                    <a:lnTlToBr w="12700" cmpd="sng">
-                      <a:noFill/>
-                      <a:prstDash val="solid"/>
-                    </a:lnTlToBr>
-                    <a:lnBlToTr w="12700" cmpd="sng">
-                      <a:noFill/>
-                      <a:prstDash val="solid"/>
-                    </a:lnBlToTr>
-                    <a:solidFill>
-                      <a:schemeClr val="accent5"/>
-                    </a:solidFill>
-                  </a:tcPr>
-                </a:tc>
-                <a:tc>
-                  <a:txBody>
-                    <a:bodyPr/>
-                    <a:lstStyle/>
-                    <a:p>
-                      <a:pPr algn="r"/>
-                      <a:r>
-                        <a:rPr lang="de-CH" sz="600" dirty="0">
-                          <a:solidFill>
-                            <a:schemeClr val="accent1"/>
-                          </a:solidFill>
-                        </a:rPr>
-                        <a:t>6</a:t>
-                      </a:r>
-                    </a:p>
-                  </a:txBody>
-                  <a:tcPr marL="50911" marR="50911" marT="25456" marB="50912">
-                    <a:lnL w="12700" cmpd="sng">
-                      <a:noFill/>
-                    </a:lnL>
-                    <a:lnR w="12700" cmpd="sng">
-                      <a:noFill/>
-                    </a:lnR>
-                    <a:lnT w="6350" cap="flat" cmpd="sng" algn="ctr">
-                      <a:solidFill>
-                        <a:schemeClr val="tx1"/>
-                      </a:solidFill>
-                      <a:prstDash val="solid"/>
-                      <a:round/>
-                      <a:headEnd type="none" w="med" len="med"/>
-                      <a:tailEnd type="none" w="med" len="med"/>
-                    </a:lnT>
-                    <a:lnB w="6350" cap="flat" cmpd="sng" algn="ctr">
-                      <a:solidFill>
-                        <a:schemeClr val="tx1"/>
-                      </a:solidFill>
-                      <a:prstDash val="solid"/>
-                      <a:round/>
-                      <a:headEnd type="none" w="med" len="med"/>
-                      <a:tailEnd type="none" w="med" len="med"/>
-                    </a:lnB>
-                    <a:lnTlToBr w="12700" cmpd="sng">
-                      <a:noFill/>
-                      <a:prstDash val="solid"/>
-                    </a:lnTlToBr>
-                    <a:lnBlToTr w="12700" cmpd="sng">
-                      <a:noFill/>
-                      <a:prstDash val="solid"/>
-                    </a:lnBlToTr>
-                    <a:solidFill>
-                      <a:schemeClr val="accent6"/>
-                    </a:solidFill>
-                  </a:tcPr>
-                </a:tc>
-                <a:tc>
-                  <a:txBody>
-                    <a:bodyPr/>
-                    <a:lstStyle/>
-                    <a:p>
-                      <a:pPr algn="r"/>
-                      <a:r>
-                        <a:rPr lang="de-CH" sz="600" dirty="0">
-                          <a:solidFill>
-                            <a:schemeClr val="accent1"/>
-                          </a:solidFill>
-                        </a:rPr>
-                        <a:t>1</a:t>
-                      </a:r>
-                    </a:p>
-                  </a:txBody>
-                  <a:tcPr marL="50911" marR="50911" marT="25456" marB="50912">
-                    <a:lnL w="12700" cmpd="sng">
-                      <a:noFill/>
-                    </a:lnL>
-                    <a:lnR w="12700" cmpd="sng">
-                      <a:noFill/>
-                    </a:lnR>
-                    <a:lnT w="6350" cap="flat" cmpd="sng" algn="ctr">
-                      <a:solidFill>
-                        <a:schemeClr val="tx1"/>
-                      </a:solidFill>
-                      <a:prstDash val="solid"/>
-                      <a:round/>
-                      <a:headEnd type="none" w="med" len="med"/>
-                      <a:tailEnd type="none" w="med" len="med"/>
-                    </a:lnT>
-                    <a:lnB w="6350" cap="flat" cmpd="sng" algn="ctr">
-                      <a:solidFill>
-                        <a:schemeClr val="tx1"/>
-                      </a:solidFill>
-                      <a:prstDash val="solid"/>
-                      <a:round/>
-                      <a:headEnd type="none" w="med" len="med"/>
-                      <a:tailEnd type="none" w="med" len="med"/>
-                    </a:lnB>
-                    <a:lnTlToBr w="12700" cmpd="sng">
-                      <a:noFill/>
-                      <a:prstDash val="solid"/>
-                    </a:lnTlToBr>
-                    <a:lnBlToTr w="12700" cmpd="sng">
-                      <a:noFill/>
-                      <a:prstDash val="solid"/>
-                    </a:lnBlToTr>
-                    <a:solidFill>
-                      <a:schemeClr val="accent5"/>
-                    </a:solidFill>
-                  </a:tcPr>
-                </a:tc>
-                <a:tc>
-                  <a:txBody>
-                    <a:bodyPr/>
-                    <a:lstStyle/>
-                    <a:p>
-                      <a:pPr algn="r"/>
-                      <a:r>
-                        <a:rPr lang="de-CH" sz="600" dirty="0">
-                          <a:solidFill>
-                            <a:schemeClr val="accent1"/>
-                          </a:solidFill>
-                        </a:rPr>
-                        <a:t>9</a:t>
-                      </a:r>
-                    </a:p>
-                  </a:txBody>
-                  <a:tcPr marL="50911" marR="50911" marT="25456" marB="50912">
-                    <a:lnL w="12700" cmpd="sng">
-                      <a:noFill/>
-                    </a:lnL>
-                    <a:lnR w="12700" cmpd="sng">
-                      <a:noFill/>
-                    </a:lnR>
-                    <a:lnT w="6350" cap="flat" cmpd="sng" algn="ctr">
-                      <a:solidFill>
-                        <a:schemeClr val="tx1"/>
-                      </a:solidFill>
-                      <a:prstDash val="solid"/>
-                      <a:round/>
-                      <a:headEnd type="none" w="med" len="med"/>
-                      <a:tailEnd type="none" w="med" len="med"/>
-                    </a:lnT>
-                    <a:lnB w="6350" cap="flat" cmpd="sng" algn="ctr">
-                      <a:solidFill>
-                        <a:schemeClr val="tx1"/>
-                      </a:solidFill>
-                      <a:prstDash val="solid"/>
-                      <a:round/>
-                      <a:headEnd type="none" w="med" len="med"/>
-                      <a:tailEnd type="none" w="med" len="med"/>
-                    </a:lnB>
-                    <a:lnTlToBr w="12700" cmpd="sng">
-                      <a:noFill/>
-                      <a:prstDash val="solid"/>
-                    </a:lnTlToBr>
-                    <a:lnBlToTr w="12700" cmpd="sng">
-                      <a:noFill/>
-                      <a:prstDash val="solid"/>
-                    </a:lnBlToTr>
-                    <a:solidFill>
-                      <a:schemeClr val="accent6"/>
-                    </a:solidFill>
-                  </a:tcPr>
-                </a:tc>
-                <a:tc>
-                  <a:txBody>
-                    <a:bodyPr/>
-                    <a:lstStyle/>
-                    <a:p>
-                      <a:pPr algn="r"/>
-                      <a:r>
-                        <a:rPr lang="de-CH" sz="600" dirty="0">
-                          <a:solidFill>
-                            <a:schemeClr val="accent1"/>
-                          </a:solidFill>
-                        </a:rPr>
-                        <a:t>5</a:t>
-                      </a:r>
-                    </a:p>
-                  </a:txBody>
-                  <a:tcPr marL="50911" marR="50911" marT="25456" marB="50912">
-                    <a:lnL w="12700" cmpd="sng">
-                      <a:noFill/>
-                    </a:lnL>
-                    <a:lnR w="12700" cmpd="sng">
-                      <a:noFill/>
-                    </a:lnR>
-                    <a:lnT w="6350" cap="flat" cmpd="sng" algn="ctr">
-                      <a:solidFill>
-                        <a:schemeClr val="tx1"/>
-                      </a:solidFill>
-                      <a:prstDash val="solid"/>
-                      <a:round/>
-                      <a:headEnd type="none" w="med" len="med"/>
-                      <a:tailEnd type="none" w="med" len="med"/>
-                    </a:lnT>
-                    <a:lnB w="6350" cap="flat" cmpd="sng" algn="ctr">
-                      <a:solidFill>
-                        <a:schemeClr val="tx1"/>
-                      </a:solidFill>
-                      <a:prstDash val="solid"/>
-                      <a:round/>
-                      <a:headEnd type="none" w="med" len="med"/>
-                      <a:tailEnd type="none" w="med" len="med"/>
-                    </a:lnB>
-                    <a:lnTlToBr w="12700" cmpd="sng">
-                      <a:noFill/>
-                      <a:prstDash val="solid"/>
-                    </a:lnTlToBr>
-                    <a:lnBlToTr w="12700" cmpd="sng">
-                      <a:noFill/>
-                      <a:prstDash val="solid"/>
-                    </a:lnBlToTr>
-                    <a:solidFill>
-                      <a:schemeClr val="accent5"/>
-                    </a:solidFill>
-                  </a:tcPr>
-                </a:tc>
-                <a:tc>
-                  <a:txBody>
-                    <a:bodyPr/>
-                    <a:lstStyle/>
-                    <a:p>
-                      <a:pPr algn="r"/>
-                      <a:r>
-                        <a:rPr lang="de-CH" sz="600" dirty="0">
-                          <a:solidFill>
-                            <a:schemeClr val="accent1"/>
-                          </a:solidFill>
-                        </a:rPr>
-                        <a:t>45</a:t>
-                      </a:r>
-                    </a:p>
-                  </a:txBody>
-                  <a:tcPr marL="50911" marR="50911" marT="25456" marB="50912">
-                    <a:lnL w="12700" cmpd="sng">
-                      <a:noFill/>
-                    </a:lnL>
-                    <a:lnR w="12700" cmpd="sng">
-                      <a:noFill/>
-                    </a:lnR>
-                    <a:lnT w="6350" cap="flat" cmpd="sng" algn="ctr">
-                      <a:solidFill>
-                        <a:schemeClr val="tx1"/>
-                      </a:solidFill>
-                      <a:prstDash val="solid"/>
-                      <a:round/>
-                      <a:headEnd type="none" w="med" len="med"/>
-                      <a:tailEnd type="none" w="med" len="med"/>
-                    </a:lnT>
-                    <a:lnB w="6350" cap="flat" cmpd="sng" algn="ctr">
-                      <a:solidFill>
-                        <a:schemeClr val="tx1"/>
-                      </a:solidFill>
-                      <a:prstDash val="solid"/>
-                      <a:round/>
-                      <a:headEnd type="none" w="med" len="med"/>
-                      <a:tailEnd type="none" w="med" len="med"/>
-                    </a:lnB>
-                    <a:lnTlToBr w="12700" cmpd="sng">
-                      <a:noFill/>
-                      <a:prstDash val="solid"/>
-                    </a:lnTlToBr>
-                    <a:lnBlToTr w="12700" cmpd="sng">
-                      <a:noFill/>
-                      <a:prstDash val="solid"/>
-                    </a:lnBlToTr>
-                    <a:solidFill>
-                      <a:schemeClr val="accent6"/>
-                    </a:solidFill>
-                  </a:tcPr>
-                </a:tc>
-                <a:tc>
-                  <a:txBody>
-                    <a:bodyPr/>
-                    <a:lstStyle/>
-                    <a:p>
-                      <a:pPr algn="r"/>
-                      <a:r>
-                        <a:rPr lang="de-CH" sz="600" dirty="0">
-                          <a:solidFill>
-                            <a:schemeClr val="accent1"/>
-                          </a:solidFill>
-                        </a:rPr>
-                        <a:t>76</a:t>
-                      </a:r>
-                    </a:p>
-                  </a:txBody>
-                  <a:tcPr marL="50911" marR="50911" marT="25456" marB="50912">
-                    <a:lnL w="12700" cmpd="sng">
-                      <a:noFill/>
-                    </a:lnL>
-                    <a:lnR w="12700" cmpd="sng">
-                      <a:noFill/>
-                    </a:lnR>
-                    <a:lnT w="6350" cap="flat" cmpd="sng" algn="ctr">
-                      <a:solidFill>
-                        <a:schemeClr val="tx1"/>
-                      </a:solidFill>
-                      <a:prstDash val="solid"/>
-                      <a:round/>
-                      <a:headEnd type="none" w="med" len="med"/>
-                      <a:tailEnd type="none" w="med" len="med"/>
-                    </a:lnT>
-                    <a:lnB w="6350" cap="flat" cmpd="sng" algn="ctr">
-                      <a:solidFill>
-                        <a:schemeClr val="tx1"/>
-                      </a:solidFill>
-                      <a:prstDash val="solid"/>
-                      <a:round/>
-                      <a:headEnd type="none" w="med" len="med"/>
-                      <a:tailEnd type="none" w="med" len="med"/>
-                    </a:lnB>
-                    <a:lnTlToBr w="12700" cmpd="sng">
-                      <a:noFill/>
-                      <a:prstDash val="solid"/>
-                    </a:lnTlToBr>
-                    <a:lnBlToTr w="12700" cmpd="sng">
-                      <a:noFill/>
-                      <a:prstDash val="solid"/>
-                    </a:lnBlToTr>
-                    <a:solidFill>
-                      <a:schemeClr val="accent5"/>
-                    </a:solidFill>
-                  </a:tcPr>
-                </a:tc>
-                <a:tc>
-                  <a:txBody>
-                    <a:bodyPr/>
-                    <a:lstStyle/>
-                    <a:p>
-                      <a:pPr algn="r"/>
-                      <a:r>
-                        <a:rPr lang="de-CH" sz="600" dirty="0">
-                          <a:solidFill>
-                            <a:schemeClr val="accent1"/>
-                          </a:solidFill>
-                        </a:rPr>
-                        <a:t>63</a:t>
-                      </a:r>
-                    </a:p>
-                  </a:txBody>
-                  <a:tcPr marL="50911" marR="50911" marT="25456" marB="50912">
-                    <a:lnL w="12700" cmpd="sng">
-                      <a:noFill/>
-                    </a:lnL>
-                    <a:lnR w="12700" cmpd="sng">
-                      <a:noFill/>
-                    </a:lnR>
-                    <a:lnT w="6350" cap="flat" cmpd="sng" algn="ctr">
-                      <a:solidFill>
-                        <a:schemeClr val="tx1"/>
-                      </a:solidFill>
-                      <a:prstDash val="solid"/>
-                      <a:round/>
-                      <a:headEnd type="none" w="med" len="med"/>
-                      <a:tailEnd type="none" w="med" len="med"/>
-                    </a:lnT>
-                    <a:lnB w="6350" cap="flat" cmpd="sng" algn="ctr">
-                      <a:solidFill>
-                        <a:schemeClr val="tx1"/>
-                      </a:solidFill>
-                      <a:prstDash val="solid"/>
-                      <a:round/>
-                      <a:headEnd type="none" w="med" len="med"/>
-                      <a:tailEnd type="none" w="med" len="med"/>
-                    </a:lnB>
-                    <a:lnTlToBr w="12700" cmpd="sng">
-                      <a:noFill/>
-                      <a:prstDash val="solid"/>
-                    </a:lnTlToBr>
-                    <a:lnBlToTr w="12700" cmpd="sng">
-                      <a:noFill/>
-                      <a:prstDash val="solid"/>
-                    </a:lnBlToTr>
-                    <a:solidFill>
-                      <a:schemeClr val="accent6"/>
-                    </a:solidFill>
-                  </a:tcPr>
-                </a:tc>
-                <a:extLst>
-                  <a:ext uri="{0D108BD9-81ED-4DB2-BD59-A6C34878D82A}">
-                    <a16:rowId xmlns:a16="http://schemas.microsoft.com/office/drawing/2014/main" val="10003"/>
-                  </a:ext>
-                </a:extLst>
-              </a:tr>
-              <a:tr h="141027">
-                <a:tc>
-                  <a:txBody>
-                    <a:bodyPr/>
-                    <a:lstStyle/>
-                    <a:p>
-                      <a:r>
-                        <a:rPr lang="de-CH" sz="600" dirty="0">
-                          <a:solidFill>
-                            <a:schemeClr val="accent1"/>
-                          </a:solidFill>
-                        </a:rPr>
-                        <a:t>Table title </a:t>
-                      </a:r>
-                      <a:r>
-                        <a:rPr lang="de-CH" sz="600" dirty="0" err="1">
-                          <a:solidFill>
-                            <a:schemeClr val="accent1"/>
-                          </a:solidFill>
-                        </a:rPr>
-                        <a:t>left</a:t>
-                      </a:r>
-                      <a:endParaRPr lang="de-CH" sz="600" dirty="0">
-                        <a:solidFill>
-                          <a:schemeClr val="accent1"/>
-                        </a:solidFill>
-                      </a:endParaRPr>
-                    </a:p>
-                  </a:txBody>
-                  <a:tcPr marL="50911" marR="50911" marT="25456" marB="50912">
-                    <a:lnL w="12700" cmpd="sng">
-                      <a:noFill/>
-                    </a:lnL>
-                    <a:lnR w="12700" cmpd="sng">
-                      <a:noFill/>
-                    </a:lnR>
-                    <a:lnT w="6350" cap="flat" cmpd="sng" algn="ctr">
-                      <a:solidFill>
-                        <a:schemeClr val="tx1"/>
-                      </a:solidFill>
-                      <a:prstDash val="solid"/>
-                      <a:round/>
-                      <a:headEnd type="none" w="med" len="med"/>
-                      <a:tailEnd type="none" w="med" len="med"/>
-                    </a:lnT>
-                    <a:lnB w="6350" cap="flat" cmpd="sng" algn="ctr">
-                      <a:solidFill>
-                        <a:schemeClr val="tx1"/>
-                      </a:solidFill>
-                      <a:prstDash val="solid"/>
-                      <a:round/>
-                      <a:headEnd type="none" w="med" len="med"/>
-                      <a:tailEnd type="none" w="med" len="med"/>
-                    </a:lnB>
-                    <a:lnTlToBr w="12700" cmpd="sng">
-                      <a:noFill/>
-                      <a:prstDash val="solid"/>
-                    </a:lnTlToBr>
-                    <a:lnBlToTr w="12700" cmpd="sng">
-                      <a:noFill/>
-                      <a:prstDash val="solid"/>
-                    </a:lnBlToTr>
-                    <a:solidFill>
-                      <a:schemeClr val="accent6"/>
-                    </a:solidFill>
-                  </a:tcPr>
-                </a:tc>
-                <a:tc>
-                  <a:txBody>
-                    <a:bodyPr/>
-                    <a:lstStyle/>
-                    <a:p>
-                      <a:pPr algn="r"/>
-                      <a:r>
-                        <a:rPr lang="de-CH" sz="600" dirty="0">
-                          <a:solidFill>
-                            <a:schemeClr val="accent1"/>
-                          </a:solidFill>
-                        </a:rPr>
-                        <a:t>23</a:t>
-                      </a:r>
-                    </a:p>
-                  </a:txBody>
-                  <a:tcPr marL="50911" marR="50911" marT="25456" marB="50912">
-                    <a:lnL w="12700" cmpd="sng">
-                      <a:noFill/>
-                    </a:lnL>
-                    <a:lnR w="12700" cmpd="sng">
-                      <a:noFill/>
-                    </a:lnR>
-                    <a:lnT w="6350" cap="flat" cmpd="sng" algn="ctr">
-                      <a:solidFill>
-                        <a:schemeClr val="tx1"/>
-                      </a:solidFill>
-                      <a:prstDash val="solid"/>
-                      <a:round/>
-                      <a:headEnd type="none" w="med" len="med"/>
-                      <a:tailEnd type="none" w="med" len="med"/>
-                    </a:lnT>
-                    <a:lnB w="6350" cap="flat" cmpd="sng" algn="ctr">
-                      <a:solidFill>
-                        <a:schemeClr val="tx1"/>
-                      </a:solidFill>
-                      <a:prstDash val="solid"/>
-                      <a:round/>
-                      <a:headEnd type="none" w="med" len="med"/>
-                      <a:tailEnd type="none" w="med" len="med"/>
-                    </a:lnB>
-                    <a:lnTlToBr w="12700" cmpd="sng">
-                      <a:noFill/>
-                      <a:prstDash val="solid"/>
-                    </a:lnTlToBr>
-                    <a:lnBlToTr w="12700" cmpd="sng">
-                      <a:noFill/>
-                      <a:prstDash val="solid"/>
-                    </a:lnBlToTr>
-                    <a:solidFill>
-                      <a:schemeClr val="accent5"/>
-                    </a:solidFill>
-                  </a:tcPr>
-                </a:tc>
-                <a:tc>
-                  <a:txBody>
-                    <a:bodyPr/>
-                    <a:lstStyle/>
-                    <a:p>
-                      <a:pPr algn="r"/>
-                      <a:r>
-                        <a:rPr lang="de-CH" sz="600" dirty="0">
-                          <a:solidFill>
-                            <a:schemeClr val="accent1"/>
-                          </a:solidFill>
-                        </a:rPr>
-                        <a:t>4</a:t>
-                      </a:r>
-                    </a:p>
-                  </a:txBody>
-                  <a:tcPr marL="50911" marR="50911" marT="25456" marB="50912">
-                    <a:lnL w="12700" cmpd="sng">
-                      <a:noFill/>
-                    </a:lnL>
-                    <a:lnR w="12700" cmpd="sng">
-                      <a:noFill/>
-                    </a:lnR>
-                    <a:lnT w="6350" cap="flat" cmpd="sng" algn="ctr">
-                      <a:solidFill>
-                        <a:schemeClr val="tx1"/>
-                      </a:solidFill>
-                      <a:prstDash val="solid"/>
-                      <a:round/>
-                      <a:headEnd type="none" w="med" len="med"/>
-                      <a:tailEnd type="none" w="med" len="med"/>
-                    </a:lnT>
-                    <a:lnB w="6350" cap="flat" cmpd="sng" algn="ctr">
-                      <a:solidFill>
-                        <a:schemeClr val="tx1"/>
-                      </a:solidFill>
-                      <a:prstDash val="solid"/>
-                      <a:round/>
-                      <a:headEnd type="none" w="med" len="med"/>
-                      <a:tailEnd type="none" w="med" len="med"/>
-                    </a:lnB>
-                    <a:lnTlToBr w="12700" cmpd="sng">
-                      <a:noFill/>
-                      <a:prstDash val="solid"/>
-                    </a:lnTlToBr>
-                    <a:lnBlToTr w="12700" cmpd="sng">
-                      <a:noFill/>
-                      <a:prstDash val="solid"/>
-                    </a:lnBlToTr>
-                    <a:solidFill>
-                      <a:schemeClr val="accent6"/>
-                    </a:solidFill>
-                  </a:tcPr>
-                </a:tc>
-                <a:tc>
-                  <a:txBody>
-                    <a:bodyPr/>
-                    <a:lstStyle/>
-                    <a:p>
-                      <a:pPr algn="r"/>
-                      <a:r>
-                        <a:rPr lang="de-CH" sz="600" dirty="0">
-                          <a:solidFill>
-                            <a:schemeClr val="accent1"/>
-                          </a:solidFill>
-                        </a:rPr>
-                        <a:t>3</a:t>
-                      </a:r>
-                    </a:p>
-                  </a:txBody>
-                  <a:tcPr marL="50911" marR="50911" marT="25456" marB="50912">
-                    <a:lnL w="12700" cmpd="sng">
-                      <a:noFill/>
-                    </a:lnL>
-                    <a:lnR w="12700" cmpd="sng">
-                      <a:noFill/>
-                    </a:lnR>
-                    <a:lnT w="6350" cap="flat" cmpd="sng" algn="ctr">
-                      <a:solidFill>
-                        <a:schemeClr val="tx1"/>
-                      </a:solidFill>
-                      <a:prstDash val="solid"/>
-                      <a:round/>
-                      <a:headEnd type="none" w="med" len="med"/>
-                      <a:tailEnd type="none" w="med" len="med"/>
-                    </a:lnT>
-                    <a:lnB w="6350" cap="flat" cmpd="sng" algn="ctr">
-                      <a:solidFill>
-                        <a:schemeClr val="tx1"/>
-                      </a:solidFill>
-                      <a:prstDash val="solid"/>
-                      <a:round/>
-                      <a:headEnd type="none" w="med" len="med"/>
-                      <a:tailEnd type="none" w="med" len="med"/>
-                    </a:lnB>
-                    <a:lnTlToBr w="12700" cmpd="sng">
-                      <a:noFill/>
-                      <a:prstDash val="solid"/>
-                    </a:lnTlToBr>
-                    <a:lnBlToTr w="12700" cmpd="sng">
-                      <a:noFill/>
-                      <a:prstDash val="solid"/>
-                    </a:lnBlToTr>
-                    <a:solidFill>
-                      <a:schemeClr val="accent5"/>
-                    </a:solidFill>
-                  </a:tcPr>
-                </a:tc>
-                <a:tc>
-                  <a:txBody>
-                    <a:bodyPr/>
-                    <a:lstStyle/>
-                    <a:p>
-                      <a:pPr algn="r"/>
-                      <a:r>
-                        <a:rPr lang="de-CH" sz="600" dirty="0">
-                          <a:solidFill>
-                            <a:schemeClr val="accent1"/>
-                          </a:solidFill>
-                        </a:rPr>
-                        <a:t>4</a:t>
-                      </a:r>
-                    </a:p>
-                  </a:txBody>
-                  <a:tcPr marL="50911" marR="50911" marT="25456" marB="50912">
-                    <a:lnL w="12700" cmpd="sng">
-                      <a:noFill/>
-                    </a:lnL>
-                    <a:lnR w="12700" cmpd="sng">
-                      <a:noFill/>
-                    </a:lnR>
-                    <a:lnT w="6350" cap="flat" cmpd="sng" algn="ctr">
-                      <a:solidFill>
-                        <a:schemeClr val="tx1"/>
-                      </a:solidFill>
-                      <a:prstDash val="solid"/>
-                      <a:round/>
-                      <a:headEnd type="none" w="med" len="med"/>
-                      <a:tailEnd type="none" w="med" len="med"/>
-                    </a:lnT>
-                    <a:lnB w="6350" cap="flat" cmpd="sng" algn="ctr">
-                      <a:solidFill>
-                        <a:schemeClr val="tx1"/>
-                      </a:solidFill>
-                      <a:prstDash val="solid"/>
-                      <a:round/>
-                      <a:headEnd type="none" w="med" len="med"/>
-                      <a:tailEnd type="none" w="med" len="med"/>
-                    </a:lnB>
-                    <a:lnTlToBr w="12700" cmpd="sng">
-                      <a:noFill/>
-                      <a:prstDash val="solid"/>
-                    </a:lnTlToBr>
-                    <a:lnBlToTr w="12700" cmpd="sng">
-                      <a:noFill/>
-                      <a:prstDash val="solid"/>
-                    </a:lnBlToTr>
-                    <a:solidFill>
-                      <a:schemeClr val="accent6"/>
-                    </a:solidFill>
-                  </a:tcPr>
-                </a:tc>
-                <a:tc>
-                  <a:txBody>
-                    <a:bodyPr/>
-                    <a:lstStyle/>
-                    <a:p>
-                      <a:pPr algn="r"/>
-                      <a:r>
-                        <a:rPr lang="de-CH" sz="600" dirty="0">
-                          <a:solidFill>
-                            <a:schemeClr val="accent1"/>
-                          </a:solidFill>
-                        </a:rPr>
-                        <a:t>6</a:t>
-                      </a:r>
-                    </a:p>
-                  </a:txBody>
-                  <a:tcPr marL="50911" marR="50911" marT="25456" marB="50912">
-                    <a:lnL w="12700" cmpd="sng">
-                      <a:noFill/>
-                    </a:lnL>
-                    <a:lnR w="12700" cmpd="sng">
-                      <a:noFill/>
-                    </a:lnR>
-                    <a:lnT w="6350" cap="flat" cmpd="sng" algn="ctr">
-                      <a:solidFill>
-                        <a:schemeClr val="tx1"/>
-                      </a:solidFill>
-                      <a:prstDash val="solid"/>
-                      <a:round/>
-                      <a:headEnd type="none" w="med" len="med"/>
-                      <a:tailEnd type="none" w="med" len="med"/>
-                    </a:lnT>
-                    <a:lnB w="6350" cap="flat" cmpd="sng" algn="ctr">
-                      <a:solidFill>
-                        <a:schemeClr val="tx1"/>
-                      </a:solidFill>
-                      <a:prstDash val="solid"/>
-                      <a:round/>
-                      <a:headEnd type="none" w="med" len="med"/>
-                      <a:tailEnd type="none" w="med" len="med"/>
-                    </a:lnB>
-                    <a:lnTlToBr w="12700" cmpd="sng">
-                      <a:noFill/>
-                      <a:prstDash val="solid"/>
-                    </a:lnTlToBr>
-                    <a:lnBlToTr w="12700" cmpd="sng">
-                      <a:noFill/>
-                      <a:prstDash val="solid"/>
-                    </a:lnBlToTr>
-                    <a:solidFill>
-                      <a:schemeClr val="accent5"/>
-                    </a:solidFill>
-                  </a:tcPr>
-                </a:tc>
-                <a:tc>
-                  <a:txBody>
-                    <a:bodyPr/>
-                    <a:lstStyle/>
-                    <a:p>
-                      <a:pPr algn="r"/>
-                      <a:r>
-                        <a:rPr lang="de-CH" sz="600" dirty="0">
-                          <a:solidFill>
-                            <a:schemeClr val="accent1"/>
-                          </a:solidFill>
-                        </a:rPr>
-                        <a:t>45</a:t>
-                      </a:r>
-                    </a:p>
-                  </a:txBody>
-                  <a:tcPr marL="50911" marR="50911" marT="25456" marB="50912">
-                    <a:lnL w="12700" cmpd="sng">
-                      <a:noFill/>
-                    </a:lnL>
-                    <a:lnR w="12700" cmpd="sng">
-                      <a:noFill/>
-                    </a:lnR>
-                    <a:lnT w="6350" cap="flat" cmpd="sng" algn="ctr">
-                      <a:solidFill>
-                        <a:schemeClr val="tx1"/>
-                      </a:solidFill>
-                      <a:prstDash val="solid"/>
-                      <a:round/>
-                      <a:headEnd type="none" w="med" len="med"/>
-                      <a:tailEnd type="none" w="med" len="med"/>
-                    </a:lnT>
-                    <a:lnB w="6350" cap="flat" cmpd="sng" algn="ctr">
-                      <a:solidFill>
-                        <a:schemeClr val="tx1"/>
-                      </a:solidFill>
-                      <a:prstDash val="solid"/>
-                      <a:round/>
-                      <a:headEnd type="none" w="med" len="med"/>
-                      <a:tailEnd type="none" w="med" len="med"/>
-                    </a:lnB>
-                    <a:lnTlToBr w="12700" cmpd="sng">
-                      <a:noFill/>
-                      <a:prstDash val="solid"/>
-                    </a:lnTlToBr>
-                    <a:lnBlToTr w="12700" cmpd="sng">
-                      <a:noFill/>
-                      <a:prstDash val="solid"/>
-                    </a:lnBlToTr>
-                    <a:solidFill>
-                      <a:schemeClr val="accent6"/>
-                    </a:solidFill>
-                  </a:tcPr>
-                </a:tc>
-                <a:tc>
-                  <a:txBody>
-                    <a:bodyPr/>
-                    <a:lstStyle/>
-                    <a:p>
-                      <a:pPr algn="r"/>
-                      <a:r>
-                        <a:rPr lang="de-CH" sz="600" dirty="0">
-                          <a:solidFill>
-                            <a:schemeClr val="accent1"/>
-                          </a:solidFill>
-                        </a:rPr>
-                        <a:t>20</a:t>
-                      </a:r>
-                    </a:p>
-                  </a:txBody>
-                  <a:tcPr marL="50911" marR="50911" marT="25456" marB="50912">
-                    <a:lnL w="12700" cmpd="sng">
-                      <a:noFill/>
-                    </a:lnL>
-                    <a:lnR w="12700" cmpd="sng">
-                      <a:noFill/>
-                    </a:lnR>
-                    <a:lnT w="6350" cap="flat" cmpd="sng" algn="ctr">
-                      <a:solidFill>
-                        <a:schemeClr val="tx1"/>
-                      </a:solidFill>
-                      <a:prstDash val="solid"/>
-                      <a:round/>
-                      <a:headEnd type="none" w="med" len="med"/>
-                      <a:tailEnd type="none" w="med" len="med"/>
-                    </a:lnT>
-                    <a:lnB w="6350" cap="flat" cmpd="sng" algn="ctr">
-                      <a:solidFill>
-                        <a:schemeClr val="tx1"/>
-                      </a:solidFill>
-                      <a:prstDash val="solid"/>
-                      <a:round/>
-                      <a:headEnd type="none" w="med" len="med"/>
-                      <a:tailEnd type="none" w="med" len="med"/>
-                    </a:lnB>
-                    <a:lnTlToBr w="12700" cmpd="sng">
-                      <a:noFill/>
-                      <a:prstDash val="solid"/>
-                    </a:lnTlToBr>
-                    <a:lnBlToTr w="12700" cmpd="sng">
-                      <a:noFill/>
-                      <a:prstDash val="solid"/>
-                    </a:lnBlToTr>
-                    <a:solidFill>
-                      <a:schemeClr val="accent5"/>
-                    </a:solidFill>
-                  </a:tcPr>
-                </a:tc>
-                <a:tc>
-                  <a:txBody>
-                    <a:bodyPr/>
-                    <a:lstStyle/>
-                    <a:p>
-                      <a:pPr algn="r"/>
-                      <a:r>
-                        <a:rPr lang="de-CH" sz="600" dirty="0">
-                          <a:solidFill>
-                            <a:schemeClr val="accent1"/>
-                          </a:solidFill>
-                        </a:rPr>
-                        <a:t>45</a:t>
-                      </a:r>
-                    </a:p>
-                  </a:txBody>
-                  <a:tcPr marL="50911" marR="50911" marT="25456" marB="50912">
-                    <a:lnL w="12700" cmpd="sng">
-                      <a:noFill/>
-                    </a:lnL>
-                    <a:lnR w="12700" cmpd="sng">
-                      <a:noFill/>
-                    </a:lnR>
-                    <a:lnT w="6350" cap="flat" cmpd="sng" algn="ctr">
-                      <a:solidFill>
-                        <a:schemeClr val="tx1"/>
-                      </a:solidFill>
-                      <a:prstDash val="solid"/>
-                      <a:round/>
-                      <a:headEnd type="none" w="med" len="med"/>
-                      <a:tailEnd type="none" w="med" len="med"/>
-                    </a:lnT>
-                    <a:lnB w="6350" cap="flat" cmpd="sng" algn="ctr">
-                      <a:solidFill>
-                        <a:schemeClr val="tx1"/>
-                      </a:solidFill>
-                      <a:prstDash val="solid"/>
-                      <a:round/>
-                      <a:headEnd type="none" w="med" len="med"/>
-                      <a:tailEnd type="none" w="med" len="med"/>
-                    </a:lnB>
-                    <a:lnTlToBr w="12700" cmpd="sng">
-                      <a:noFill/>
-                      <a:prstDash val="solid"/>
-                    </a:lnTlToBr>
-                    <a:lnBlToTr w="12700" cmpd="sng">
-                      <a:noFill/>
-                      <a:prstDash val="solid"/>
-                    </a:lnBlToTr>
-                    <a:solidFill>
-                      <a:schemeClr val="accent6"/>
-                    </a:solidFill>
-                  </a:tcPr>
-                </a:tc>
-                <a:extLst>
-                  <a:ext uri="{0D108BD9-81ED-4DB2-BD59-A6C34878D82A}">
-                    <a16:rowId xmlns:a16="http://schemas.microsoft.com/office/drawing/2014/main" val="10004"/>
-                  </a:ext>
-                </a:extLst>
-              </a:tr>
-            </a:tbl>
-          </a:graphicData>
-        </a:graphic>
-      </p:graphicFrame>
       <p:sp>
         <p:nvSpPr>
           <p:cNvPr id="50" name="Textplatzhalter 2"/>
@@ -55658,8 +53610,8 @@
         </p:blipFill>
         <p:spPr>
           <a:xfrm>
-            <a:off x="6787234" y="4626620"/>
-            <a:ext cx="1548055" cy="1548055"/>
+            <a:off x="5598924" y="5202684"/>
+            <a:ext cx="1530290" cy="1530290"/>
           </a:xfrm>
           <a:prstGeom prst="rect">
             <a:avLst/>
@@ -55674,8 +53626,8 @@
         </p:nvSpPr>
         <p:spPr>
           <a:xfrm>
-            <a:off x="6787234" y="6181069"/>
-            <a:ext cx="1548055" cy="390060"/>
+            <a:off x="5592026" y="6684832"/>
+            <a:ext cx="1537188" cy="318052"/>
           </a:xfrm>
           <a:prstGeom prst="rect">
             <a:avLst/>
@@ -55694,7 +53646,7 @@
                   <a:schemeClr val="accent1"/>
                 </a:solidFill>
               </a:rPr>
-              <a:t>Fig. 2. </a:t>
+              <a:t>Fig. 3. </a:t>
             </a:r>
             <a:r>
               <a:rPr lang="de-CH" sz="600" b="1" dirty="0">
@@ -55817,22 +53769,212 @@
               <a:t> Google</a:t>
             </a:r>
             <a:r>
-              <a:rPr lang="en-US" sz="600" b="1" baseline="30000"/>
+              <a:rPr lang="en-US" sz="600" b="1" baseline="30000" dirty="0"/>
               <a:t>3</a:t>
             </a:r>
             <a:r>
-              <a:rPr lang="de-CH" sz="600" b="1">
+              <a:rPr lang="de-CH" sz="600" b="1" dirty="0">
                 <a:solidFill>
                   <a:schemeClr val="accent1"/>
                 </a:solidFill>
               </a:rPr>
               <a:t>.</a:t>
             </a:r>
-            <a:endParaRPr lang="de-CH" sz="600" b="1" dirty="0">
-              <a:solidFill>
-                <a:schemeClr val="accent1"/>
-              </a:solidFill>
-            </a:endParaRPr>
+          </a:p>
+        </p:txBody>
+      </p:sp>
+      <p:pic>
+        <p:nvPicPr>
+          <p:cNvPr id="9" name="Grafik 8"/>
+          <p:cNvPicPr>
+            <a:picLocks noChangeAspect="1"/>
+          </p:cNvPicPr>
+          <p:nvPr/>
+        </p:nvPicPr>
+        <p:blipFill>
+          <a:blip r:embed="rId5" cstate="print">
+            <a:extLst>
+              <a:ext uri="{28A0092B-C50C-407E-A947-70E740481C1C}">
+                <a14:useLocalDpi xmlns:a14="http://schemas.microsoft.com/office/drawing/2010/main" val="0"/>
+              </a:ext>
+            </a:extLst>
+          </a:blip>
+          <a:stretch>
+            <a:fillRect/>
+          </a:stretch>
+        </p:blipFill>
+        <p:spPr>
+          <a:xfrm>
+            <a:off x="5598925" y="4122564"/>
+            <a:ext cx="2610409" cy="555278"/>
+          </a:xfrm>
+          <a:prstGeom prst="rect">
+            <a:avLst/>
+          </a:prstGeom>
+        </p:spPr>
+      </p:pic>
+      <p:sp>
+        <p:nvSpPr>
+          <p:cNvPr id="25" name="Textfeld 24"/>
+          <p:cNvSpPr txBox="1"/>
+          <p:nvPr/>
+        </p:nvSpPr>
+        <p:spPr>
+          <a:xfrm>
+            <a:off x="5598924" y="4640073"/>
+            <a:ext cx="4135111" cy="202571"/>
+          </a:xfrm>
+          <a:prstGeom prst="rect">
+            <a:avLst/>
+          </a:prstGeom>
+          <a:noFill/>
+        </p:spPr>
+        <p:txBody>
+          <a:bodyPr wrap="square" lIns="0" tIns="72000" rIns="0" bIns="0" rtlCol="0">
+            <a:noAutofit/>
+          </a:bodyPr>
+          <a:lstStyle/>
+          <a:p>
+            <a:r>
+              <a:rPr lang="en-US" sz="600" b="1" dirty="0">
+                <a:solidFill>
+                  <a:schemeClr val="accent1"/>
+                </a:solidFill>
+              </a:rPr>
+              <a:t>Fig. 2. </a:t>
+            </a:r>
+            <a:r>
+              <a:rPr lang="de-CH" sz="600" b="1" dirty="0">
+                <a:solidFill>
+                  <a:schemeClr val="accent1"/>
+                </a:solidFill>
+              </a:rPr>
+              <a:t>An </a:t>
+            </a:r>
+            <a:r>
+              <a:rPr lang="de-CH" sz="600" b="1" dirty="0" err="1">
+                <a:solidFill>
+                  <a:schemeClr val="accent1"/>
+                </a:solidFill>
+              </a:rPr>
+              <a:t>example</a:t>
+            </a:r>
+            <a:r>
+              <a:rPr lang="de-CH" sz="600" b="1" dirty="0">
+                <a:solidFill>
+                  <a:schemeClr val="accent1"/>
+                </a:solidFill>
+              </a:rPr>
+              <a:t> </a:t>
+            </a:r>
+            <a:r>
+              <a:rPr lang="de-CH" sz="600" b="1" dirty="0" err="1">
+                <a:solidFill>
+                  <a:schemeClr val="accent1"/>
+                </a:solidFill>
+              </a:rPr>
+              <a:t>of</a:t>
+            </a:r>
+            <a:r>
+              <a:rPr lang="de-CH" sz="600" b="1" dirty="0">
+                <a:solidFill>
+                  <a:schemeClr val="accent1"/>
+                </a:solidFill>
+              </a:rPr>
+              <a:t> an </a:t>
+            </a:r>
+            <a:r>
+              <a:rPr lang="de-CH" sz="600" b="1" dirty="0" err="1">
+                <a:solidFill>
+                  <a:schemeClr val="accent1"/>
+                </a:solidFill>
+              </a:rPr>
+              <a:t>omnidirectional</a:t>
+            </a:r>
+            <a:r>
+              <a:rPr lang="de-CH" sz="600" b="1" dirty="0">
+                <a:solidFill>
+                  <a:schemeClr val="accent1"/>
+                </a:solidFill>
+              </a:rPr>
+              <a:t> </a:t>
+            </a:r>
+            <a:r>
+              <a:rPr lang="de-CH" sz="600" b="1" dirty="0" err="1">
+                <a:solidFill>
+                  <a:schemeClr val="accent1"/>
+                </a:solidFill>
+              </a:rPr>
+              <a:t>stereo</a:t>
+            </a:r>
+            <a:r>
+              <a:rPr lang="de-CH" sz="600" b="1" dirty="0">
+                <a:solidFill>
+                  <a:schemeClr val="accent1"/>
+                </a:solidFill>
+              </a:rPr>
+              <a:t> </a:t>
+            </a:r>
+            <a:r>
+              <a:rPr lang="de-CH" sz="600" b="1" dirty="0" err="1">
+                <a:solidFill>
+                  <a:schemeClr val="accent1"/>
+                </a:solidFill>
+              </a:rPr>
+              <a:t>image</a:t>
+            </a:r>
+            <a:r>
+              <a:rPr lang="de-CH" sz="600" b="1" dirty="0">
+                <a:solidFill>
+                  <a:schemeClr val="accent1"/>
+                </a:solidFill>
+              </a:rPr>
+              <a:t>, </a:t>
+            </a:r>
+            <a:r>
+              <a:rPr lang="de-CH" sz="600" b="1" dirty="0" err="1">
+                <a:solidFill>
+                  <a:schemeClr val="accent1"/>
+                </a:solidFill>
+              </a:rPr>
+              <a:t>produced</a:t>
+            </a:r>
+            <a:r>
+              <a:rPr lang="de-CH" sz="600" b="1" dirty="0">
+                <a:solidFill>
+                  <a:schemeClr val="accent1"/>
+                </a:solidFill>
+              </a:rPr>
+              <a:t> </a:t>
+            </a:r>
+            <a:r>
+              <a:rPr lang="de-CH" sz="600" b="1" dirty="0" err="1">
+                <a:solidFill>
+                  <a:schemeClr val="accent1"/>
+                </a:solidFill>
+              </a:rPr>
+              <a:t>by</a:t>
+            </a:r>
+            <a:r>
+              <a:rPr lang="de-CH" sz="600" b="1" dirty="0">
+                <a:solidFill>
+                  <a:schemeClr val="accent1"/>
+                </a:solidFill>
+              </a:rPr>
+              <a:t> Google</a:t>
+            </a:r>
+            <a:r>
+              <a:rPr lang="en-US" sz="600" b="1" baseline="30000" dirty="0"/>
+              <a:t>3</a:t>
+            </a:r>
+            <a:r>
+              <a:rPr lang="de-CH" sz="600" b="1" dirty="0">
+                <a:solidFill>
+                  <a:schemeClr val="accent1"/>
+                </a:solidFill>
+              </a:rPr>
+              <a:t>.</a:t>
+            </a:r>
           </a:p>
         </p:txBody>
       </p:sp>

</xml_diff>

<commit_message>
first version of poster
</commit_message>
<xml_diff>
--- a/poster/Group9_poster.pptx
+++ b/poster/Group9_poster.pptx
@@ -49261,15 +49261,7 @@
             </a:br>
             <a:r>
               <a:rPr lang="en-US" dirty="0"/>
-              <a:t>The main idea of </a:t>
-            </a:r>
-            <a:r>
-              <a:rPr lang="en-US"/>
-              <a:t>the stitching </a:t>
-            </a:r>
-            <a:r>
-              <a:rPr lang="en-US" dirty="0"/>
-              <a:t>procedure is to compute for each pixel the horizontal angle </a:t>
+              <a:t>The main idea of the stitching procedure is to compute for each pixel the horizontal angle </a:t>
             </a:r>
             <a:r>
               <a:rPr lang="el-GR" dirty="0"/>
@@ -51224,8 +51216,8 @@
         </p:nvSpPr>
         <p:spPr>
           <a:xfrm>
-            <a:off x="1303297" y="9060774"/>
-            <a:ext cx="2727227" cy="246366"/>
+            <a:off x="725950" y="9019108"/>
+            <a:ext cx="1362704" cy="307241"/>
           </a:xfrm>
           <a:prstGeom prst="rect">
             <a:avLst/>
@@ -51244,39 +51236,11 @@
                   <a:schemeClr val="accent1"/>
                 </a:solidFill>
               </a:rPr>
-              <a:t>Fig. 1. This figure shows the definitions of the angles </a:t>
+              <a:t>Fig. 1 This figure shows the horizontal angle </a:t>
             </a:r>
             <a:r>
               <a:rPr lang="el-GR" sz="600" b="1" dirty="0"/>
               <a:t>ϴ</a:t>
-            </a:r>
-            <a:r>
-              <a:rPr lang="de-CH" sz="600" b="1" dirty="0"/>
-              <a:t> </a:t>
-            </a:r>
-            <a:r>
-              <a:rPr lang="de-CH" sz="600" b="1" dirty="0" err="1"/>
-              <a:t>and</a:t>
-            </a:r>
-            <a:r>
-              <a:rPr lang="de-CH" sz="600" b="1" dirty="0"/>
-              <a:t> </a:t>
-            </a:r>
-            <a:r>
-              <a:rPr lang="el-GR" sz="600" b="1" dirty="0"/>
-              <a:t>Φ</a:t>
-            </a:r>
-            <a:r>
-              <a:rPr lang="de-CH" sz="600" b="1" dirty="0"/>
-              <a:t> </a:t>
-            </a:r>
-            <a:r>
-              <a:rPr lang="en-US" sz="600" b="1" dirty="0">
-                <a:solidFill>
-                  <a:schemeClr val="accent1"/>
-                </a:solidFill>
-              </a:rPr>
-              <a:t>  </a:t>
             </a:r>
             <a:endParaRPr lang="de-CH" sz="600" b="1" dirty="0">
               <a:solidFill>
@@ -51671,11 +51635,7 @@
             </a:br>
             <a:r>
               <a:rPr lang="en-US" dirty="0"/>
-              <a:t>Moreover, the quality of our produced panoramas is lower because our dataset only contained images from 10 different cameras, which additionally were not equally distributed onto the rig. Whereas in the Jump paper, they used a camera rig with 16 </a:t>
-            </a:r>
-            <a:r>
-              <a:rPr lang="en-US"/>
-              <a:t>equally-distant GoPro cameras.</a:t>
+              <a:t>Moreover, the quality of our produced panoramas is lower because our dataset only contained images from 10 different cameras, which additionally were not equally distributed onto the rig. Whereas in the Jump paper, they used a camera rig with 16 equally-distant GoPro cameras with a larger vertical field of view.</a:t>
             </a:r>
             <a:endParaRPr lang="de-CH" dirty="0"/>
           </a:p>
@@ -52680,6 +52640,9 @@
             <a:br>
               <a:rPr lang="de-CH" dirty="0"/>
             </a:br>
+            <a:br>
+              <a:rPr lang="de-CH" dirty="0"/>
+            </a:br>
             <a:r>
               <a:rPr lang="de-CH" dirty="0" err="1"/>
               <a:t>During</a:t>
@@ -52896,6 +52859,98 @@
               <a:rPr lang="de-CH" dirty="0"/>
               <a:t>.</a:t>
             </a:r>
+            <a:br>
+              <a:rPr lang="de-CH" dirty="0"/>
+            </a:br>
+            <a:r>
+              <a:rPr lang="de-CH" dirty="0" err="1"/>
+              <a:t>Furthermore</a:t>
+            </a:r>
+            <a:r>
+              <a:rPr lang="de-CH" dirty="0"/>
+              <a:t>, </a:t>
+            </a:r>
+            <a:r>
+              <a:rPr lang="de-CH" dirty="0" err="1"/>
+              <a:t>we</a:t>
+            </a:r>
+            <a:r>
+              <a:rPr lang="de-CH" dirty="0"/>
+              <a:t> also </a:t>
+            </a:r>
+            <a:r>
+              <a:rPr lang="de-CH" dirty="0" err="1"/>
+              <a:t>produced</a:t>
+            </a:r>
+            <a:r>
+              <a:rPr lang="de-CH" dirty="0"/>
+              <a:t> </a:t>
+            </a:r>
+            <a:r>
+              <a:rPr lang="de-CH" dirty="0" err="1"/>
+              <a:t>some</a:t>
+            </a:r>
+            <a:r>
+              <a:rPr lang="de-CH" dirty="0"/>
+              <a:t> simple </a:t>
+            </a:r>
+            <a:r>
+              <a:rPr lang="de-CH" dirty="0" err="1"/>
+              <a:t>datasets</a:t>
+            </a:r>
+            <a:r>
+              <a:rPr lang="de-CH" dirty="0"/>
+              <a:t> </a:t>
+            </a:r>
+            <a:r>
+              <a:rPr lang="de-CH" dirty="0" err="1"/>
+              <a:t>by</a:t>
+            </a:r>
+            <a:r>
+              <a:rPr lang="de-CH" dirty="0"/>
+              <a:t> </a:t>
+            </a:r>
+            <a:r>
+              <a:rPr lang="de-CH" dirty="0" err="1"/>
+              <a:t>ourselves</a:t>
+            </a:r>
+            <a:r>
+              <a:rPr lang="de-CH" dirty="0"/>
+              <a:t> </a:t>
+            </a:r>
+            <a:r>
+              <a:rPr lang="de-CH" dirty="0" err="1"/>
+              <a:t>with</a:t>
+            </a:r>
+            <a:r>
+              <a:rPr lang="de-CH" dirty="0"/>
+              <a:t> </a:t>
+            </a:r>
+            <a:r>
+              <a:rPr lang="de-CH" dirty="0" err="1"/>
+              <a:t>our</a:t>
+            </a:r>
+            <a:r>
+              <a:rPr lang="de-CH" dirty="0"/>
+              <a:t> </a:t>
+            </a:r>
+            <a:r>
+              <a:rPr lang="de-CH" dirty="0" err="1"/>
+              <a:t>smartphone</a:t>
+            </a:r>
+            <a:r>
+              <a:rPr lang="de-CH" dirty="0"/>
+              <a:t> </a:t>
+            </a:r>
+            <a:r>
+              <a:rPr lang="de-CH" dirty="0" err="1"/>
+              <a:t>cameras</a:t>
+            </a:r>
+            <a:r>
+              <a:rPr lang="de-CH"/>
+              <a:t>.</a:t>
+            </a:r>
+            <a:endParaRPr lang="de-CH" dirty="0"/>
           </a:p>
         </p:txBody>
       </p:sp>
@@ -53491,7 +53546,7 @@
           </p:cNvPicPr>
           <p:nvPr/>
         </p:nvPicPr>
-        <p:blipFill>
+        <p:blipFill rotWithShape="1">
           <a:blip r:embed="rId3" cstate="print">
             <a:extLst>
               <a:ext uri="{28A0092B-C50C-407E-A947-70E740481C1C}">
@@ -53499,14 +53554,13 @@
               </a:ext>
             </a:extLst>
           </a:blip>
-          <a:stretch>
-            <a:fillRect/>
-          </a:stretch>
+          <a:srcRect t="-1" r="49996" b="-6097"/>
+          <a:stretch/>
         </p:blipFill>
         <p:spPr>
           <a:xfrm>
-            <a:off x="1301769" y="7811141"/>
-            <a:ext cx="2727227" cy="1298001"/>
+            <a:off x="720502" y="7780510"/>
+            <a:ext cx="1363713" cy="1377141"/>
           </a:xfrm>
           <a:prstGeom prst="rect">
             <a:avLst/>
@@ -53900,6 +53954,93 @@
               </a:rPr>
               <a:t>.</a:t>
             </a:r>
+          </a:p>
+        </p:txBody>
+      </p:sp>
+      <p:pic>
+        <p:nvPicPr>
+          <p:cNvPr id="22" name="Grafik 21"/>
+          <p:cNvPicPr>
+            <a:picLocks noChangeAspect="1"/>
+          </p:cNvPicPr>
+          <p:nvPr/>
+        </p:nvPicPr>
+        <p:blipFill rotWithShape="1">
+          <a:blip r:embed="rId3" cstate="print">
+            <a:extLst>
+              <a:ext uri="{28A0092B-C50C-407E-A947-70E740481C1C}">
+                <a14:useLocalDpi xmlns:a14="http://schemas.microsoft.com/office/drawing/2010/main" val="0"/>
+              </a:ext>
+            </a:extLst>
+          </a:blip>
+          <a:srcRect l="50166" t="-696"/>
+          <a:stretch/>
+        </p:blipFill>
+        <p:spPr>
+          <a:xfrm>
+            <a:off x="2768148" y="7780510"/>
+            <a:ext cx="1359091" cy="1307041"/>
+          </a:xfrm>
+          <a:prstGeom prst="rect">
+            <a:avLst/>
+          </a:prstGeom>
+        </p:spPr>
+      </p:pic>
+      <p:sp>
+        <p:nvSpPr>
+          <p:cNvPr id="26" name="Textfeld 25"/>
+          <p:cNvSpPr txBox="1"/>
+          <p:nvPr/>
+        </p:nvSpPr>
+        <p:spPr>
+          <a:xfrm>
+            <a:off x="2764714" y="9019108"/>
+            <a:ext cx="1362525" cy="369569"/>
+          </a:xfrm>
+          <a:prstGeom prst="rect">
+            <a:avLst/>
+          </a:prstGeom>
+          <a:noFill/>
+        </p:spPr>
+        <p:txBody>
+          <a:bodyPr wrap="square" lIns="0" tIns="72000" rIns="0" bIns="0" rtlCol="0">
+            <a:noAutofit/>
+          </a:bodyPr>
+          <a:lstStyle/>
+          <a:p>
+            <a:r>
+              <a:rPr lang="en-US" sz="600" b="1" dirty="0">
+                <a:solidFill>
+                  <a:schemeClr val="accent1"/>
+                </a:solidFill>
+              </a:rPr>
+              <a:t>Fig. 2: This figure shows the vertical angle</a:t>
+            </a:r>
+            <a:r>
+              <a:rPr lang="de-CH" sz="600" b="1" dirty="0"/>
+              <a:t> </a:t>
+            </a:r>
+            <a:r>
+              <a:rPr lang="el-GR" sz="600" b="1" dirty="0"/>
+              <a:t>Φ</a:t>
+            </a:r>
+            <a:r>
+              <a:rPr lang="de-CH" sz="600" b="1" dirty="0"/>
+              <a:t> </a:t>
+            </a:r>
+            <a:r>
+              <a:rPr lang="en-US" sz="600" b="1" dirty="0">
+                <a:solidFill>
+                  <a:schemeClr val="accent1"/>
+                </a:solidFill>
+              </a:rPr>
+              <a:t>  </a:t>
+            </a:r>
+            <a:endParaRPr lang="de-CH" sz="600" b="1" dirty="0">
+              <a:solidFill>
+                <a:schemeClr val="accent1"/>
+              </a:solidFill>
+            </a:endParaRPr>
           </a:p>
         </p:txBody>
       </p:sp>

</xml_diff>